<commit_message>
Jornada de usuario feito
</commit_message>
<xml_diff>
--- a/Apresentação/Apresentação-Sollute.pptx
+++ b/Apresentação/Apresentação-Sollute.pptx
@@ -208,7 +208,7 @@
           <a:p>
             <a:fld id="{1233B479-B86F-4B3B-92CC-A65D21022A71}" type="datetime1">
               <a:rPr lang="pt-BR" smtClean="0"/>
-              <a:t>27/02/2022</a:t>
+              <a:t>01/03/2022</a:t>
             </a:fld>
             <a:endParaRPr lang="pt-BR" dirty="0"/>
           </a:p>
@@ -374,7 +374,7 @@
             <a:fld id="{8EE89ABE-C638-43EB-8FF2-1C40E4E3A55D}" type="datetime1">
               <a:rPr lang="pt-BR" smtClean="0"/>
               <a:pPr/>
-              <a:t>27/02/2022</a:t>
+              <a:t>01/03/2022</a:t>
             </a:fld>
             <a:endParaRPr lang="pt-BR" dirty="0"/>
           </a:p>
@@ -892,7 +892,7 @@
             <a:pPr rtl="0"/>
             <a:fld id="{ACA70E9B-807F-4AE6-92CC-96282D5E7311}" type="datetime1">
               <a:rPr lang="pt-BR" noProof="0" smtClean="0"/>
-              <a:t>27/02/2022</a:t>
+              <a:t>01/03/2022</a:t>
             </a:fld>
             <a:endParaRPr lang="pt-BR" noProof="0" dirty="0"/>
           </a:p>
@@ -1071,7 +1071,7 @@
             <a:pPr rtl="0"/>
             <a:fld id="{2F190B64-7C24-4AC5-981A-18293759B464}" type="datetime1">
               <a:rPr lang="pt-BR" noProof="0" smtClean="0"/>
-              <a:t>27/02/2022</a:t>
+              <a:t>01/03/2022</a:t>
             </a:fld>
             <a:endParaRPr lang="pt-BR" noProof="0" dirty="0"/>
           </a:p>
@@ -1260,7 +1260,7 @@
             <a:pPr rtl="0"/>
             <a:fld id="{DCB21156-01AE-471C-8785-A0104C41415F}" type="datetime1">
               <a:rPr lang="pt-BR" noProof="0" smtClean="0"/>
-              <a:t>27/02/2022</a:t>
+              <a:t>01/03/2022</a:t>
             </a:fld>
             <a:endParaRPr lang="pt-BR" noProof="0" dirty="0"/>
           </a:p>
@@ -1439,7 +1439,7 @@
             <a:pPr rtl="0"/>
             <a:fld id="{27C79FE1-4EE1-4F09-AF1C-ADB867A4DDB7}" type="datetime1">
               <a:rPr lang="pt-BR" noProof="0" smtClean="0"/>
-              <a:t>27/02/2022</a:t>
+              <a:t>01/03/2022</a:t>
             </a:fld>
             <a:endParaRPr lang="pt-BR" noProof="0" dirty="0"/>
           </a:p>
@@ -1716,7 +1716,7 @@
             <a:pPr rtl="0"/>
             <a:fld id="{5132E7D4-C3C8-491E-AF18-B3F00DDC0614}" type="datetime1">
               <a:rPr lang="pt-BR" noProof="0" smtClean="0"/>
-              <a:t>27/02/2022</a:t>
+              <a:t>01/03/2022</a:t>
             </a:fld>
             <a:endParaRPr lang="pt-BR" noProof="0" dirty="0"/>
           </a:p>
@@ -1957,7 +1957,7 @@
             <a:pPr rtl="0"/>
             <a:fld id="{FB6D9EE8-2544-4943-81D3-517B336FA10A}" type="datetime1">
               <a:rPr lang="pt-BR" noProof="0" smtClean="0"/>
-              <a:t>27/02/2022</a:t>
+              <a:t>01/03/2022</a:t>
             </a:fld>
             <a:endParaRPr lang="pt-BR" noProof="0" dirty="0"/>
           </a:p>
@@ -2324,7 +2324,7 @@
             <a:pPr rtl="0"/>
             <a:fld id="{0B952E2D-6498-45E7-A8E3-132689DDCE1E}" type="datetime1">
               <a:rPr lang="pt-BR" noProof="0" smtClean="0"/>
-              <a:t>27/02/2022</a:t>
+              <a:t>01/03/2022</a:t>
             </a:fld>
             <a:endParaRPr lang="pt-BR" noProof="0" dirty="0"/>
           </a:p>
@@ -2476,7 +2476,7 @@
             <a:pPr rtl="0"/>
             <a:fld id="{100953FF-B44C-4032-BE08-263E004F48D0}" type="datetime1">
               <a:rPr lang="pt-BR" noProof="0" smtClean="0"/>
-              <a:t>27/02/2022</a:t>
+              <a:t>01/03/2022</a:t>
             </a:fld>
             <a:endParaRPr lang="pt-BR" noProof="0" dirty="0"/>
           </a:p>
@@ -2579,7 +2579,7 @@
             <a:pPr rtl="0"/>
             <a:fld id="{EA1CED91-10F8-4F28-862B-FD4E3A97170A}" type="datetime1">
               <a:rPr lang="pt-BR" noProof="0" smtClean="0"/>
-              <a:t>27/02/2022</a:t>
+              <a:t>01/03/2022</a:t>
             </a:fld>
             <a:endParaRPr lang="pt-BR" noProof="0" dirty="0"/>
           </a:p>
@@ -2945,7 +2945,7 @@
             <a:pPr rtl="0"/>
             <a:fld id="{7ACFC77E-2AA3-4152-A54C-74981BE28E55}" type="datetime1">
               <a:rPr lang="pt-BR" noProof="0" smtClean="0"/>
-              <a:t>27/02/2022</a:t>
+              <a:t>01/03/2022</a:t>
             </a:fld>
             <a:endParaRPr lang="pt-BR" noProof="0" dirty="0"/>
           </a:p>
@@ -3312,7 +3312,7 @@
             <a:pPr rtl="0"/>
             <a:fld id="{8EC681D4-C3A8-4CE6-91AF-0785B228C7CF}" type="datetime1">
               <a:rPr lang="pt-BR" noProof="0" smtClean="0"/>
-              <a:t>27/02/2022</a:t>
+              <a:t>01/03/2022</a:t>
             </a:fld>
             <a:endParaRPr lang="pt-BR" noProof="0" dirty="0"/>
           </a:p>
@@ -3563,7 +3563,7 @@
             <a:pPr rtl="0"/>
             <a:fld id="{CB6EA007-E4DD-442B-86B0-09BBF9FC84DB}" type="datetime1">
               <a:rPr lang="pt-BR" noProof="0" smtClean="0"/>
-              <a:t>27/02/2022</a:t>
+              <a:t>01/03/2022</a:t>
             </a:fld>
             <a:endParaRPr lang="pt-BR" noProof="0" dirty="0"/>
           </a:p>
@@ -4047,7 +4047,7 @@
             <a:avLst/>
           </a:prstGeom>
           <a:solidFill>
-            <a:srgbClr val="605FAB"/>
+            <a:srgbClr val="DAD2F1"/>
           </a:solidFill>
           <a:ln>
             <a:solidFill>
@@ -4075,7 +4075,6 @@
           <a:bodyPr rtlCol="0" anchor="ctr"/>
           <a:lstStyle/>
           <a:p>
-            <a:pPr algn="ctr"/>
             <a:endParaRPr lang="pt-BR"/>
           </a:p>
         </p:txBody>
@@ -4088,7 +4087,7 @@
         </p:nvSpPr>
         <p:spPr>
           <a:xfrm>
-            <a:off x="413234" y="3968287"/>
+            <a:off x="702529" y="3613803"/>
             <a:ext cx="3229851" cy="1754326"/>
           </a:xfrm>
           <a:prstGeom prst="rect">
@@ -4103,26 +4102,28 @@
           <a:lstStyle/>
           <a:p>
             <a:r>
-              <a:rPr lang="pt-BR" sz="5400" dirty="0" smtClean="0">
+              <a:rPr lang="pt-BR" sz="5400" b="1" dirty="0" smtClean="0">
                 <a:solidFill>
-                  <a:srgbClr val="29284C"/>
+                  <a:srgbClr val="3A3A52"/>
                 </a:solidFill>
-                <a:latin typeface="Arial Rounded MT Bold" panose="020F0704030504030204" pitchFamily="34" charset="0"/>
+                <a:latin typeface="Arial" panose="020B0604020202020204" pitchFamily="34" charset="0"/>
+                <a:cs typeface="Arial" panose="020B0604020202020204" pitchFamily="34" charset="0"/>
               </a:rPr>
               <a:t>Estoque Certo</a:t>
             </a:r>
-            <a:endParaRPr lang="pt-BR" sz="5400" dirty="0">
+            <a:endParaRPr lang="pt-BR" sz="5400" b="1" dirty="0">
               <a:solidFill>
-                <a:srgbClr val="29284C"/>
+                <a:srgbClr val="3A3A52"/>
               </a:solidFill>
-              <a:latin typeface="Arial Rounded MT Bold" panose="020F0704030504030204" pitchFamily="34" charset="0"/>
+              <a:latin typeface="Arial" panose="020B0604020202020204" pitchFamily="34" charset="0"/>
+              <a:cs typeface="Arial" panose="020B0604020202020204" pitchFamily="34" charset="0"/>
             </a:endParaRPr>
           </a:p>
         </p:txBody>
       </p:sp>
       <p:pic>
         <p:nvPicPr>
-          <p:cNvPr id="15" name="Imagem 14"/>
+          <p:cNvPr id="3" name="Imagem 2"/>
           <p:cNvPicPr>
             <a:picLocks noChangeAspect="1"/>
           </p:cNvPicPr>
@@ -4136,8 +4137,8 @@
         </p:blipFill>
         <p:spPr>
           <a:xfrm>
-            <a:off x="7298" y="835028"/>
-            <a:ext cx="5872142" cy="2221699"/>
+            <a:off x="5599741" y="362098"/>
+            <a:ext cx="6858000" cy="6858000"/>
           </a:xfrm>
           <a:prstGeom prst="rect">
             <a:avLst/>
@@ -4146,7 +4147,7 @@
       </p:pic>
       <p:pic>
         <p:nvPicPr>
-          <p:cNvPr id="21" name="Imagem 20"/>
+          <p:cNvPr id="4" name="Imagem 3"/>
           <p:cNvPicPr>
             <a:picLocks noChangeAspect="1"/>
           </p:cNvPicPr>
@@ -4160,32 +4161,8 @@
         </p:blipFill>
         <p:spPr>
           <a:xfrm>
-            <a:off x="6340475" y="26860"/>
-            <a:ext cx="5851525" cy="6858000"/>
-          </a:xfrm>
-          <a:prstGeom prst="rect">
-            <a:avLst/>
-          </a:prstGeom>
-        </p:spPr>
-      </p:pic>
-      <p:pic>
-        <p:nvPicPr>
-          <p:cNvPr id="20" name="Imagem 19"/>
-          <p:cNvPicPr>
-            <a:picLocks noChangeAspect="1"/>
-          </p:cNvPicPr>
-          <p:nvPr/>
-        </p:nvPicPr>
-        <p:blipFill>
-          <a:blip r:embed="rId5"/>
-          <a:stretch>
-            <a:fillRect/>
-          </a:stretch>
-        </p:blipFill>
-        <p:spPr>
-          <a:xfrm>
-            <a:off x="6089021" y="53720"/>
-            <a:ext cx="6312560" cy="6858000"/>
+            <a:off x="702529" y="1146463"/>
+            <a:ext cx="4897212" cy="1675362"/>
           </a:xfrm>
           <a:prstGeom prst="rect">
             <a:avLst/>
@@ -4244,7 +4221,7 @@
             <a:avLst/>
           </a:prstGeom>
           <a:solidFill>
-            <a:srgbClr val="605FAB"/>
+            <a:srgbClr val="DAD2F1"/>
           </a:solidFill>
           <a:ln>
             <a:solidFill>
@@ -4292,11 +4269,11 @@
             <a:avLst/>
           </a:prstGeom>
           <a:solidFill>
-            <a:srgbClr val="DB3EAF"/>
+            <a:srgbClr val="3E00FF"/>
           </a:solidFill>
           <a:ln>
             <a:solidFill>
-              <a:schemeClr val="bg1"/>
+              <a:srgbClr val="3E00FF"/>
             </a:solidFill>
           </a:ln>
         </p:spPr>
@@ -4340,11 +4317,11 @@
             <a:avLst/>
           </a:prstGeom>
           <a:solidFill>
-            <a:srgbClr val="DB3EAF"/>
+            <a:srgbClr val="3E00FF"/>
           </a:solidFill>
           <a:ln>
             <a:solidFill>
-              <a:schemeClr val="bg1"/>
+              <a:srgbClr val="3E00FF"/>
             </a:solidFill>
           </a:ln>
         </p:spPr>
@@ -4388,11 +4365,11 @@
             <a:avLst/>
           </a:prstGeom>
           <a:solidFill>
-            <a:srgbClr val="DB3EAF"/>
+            <a:srgbClr val="3E00FF"/>
           </a:solidFill>
           <a:ln>
             <a:solidFill>
-              <a:schemeClr val="bg1"/>
+              <a:srgbClr val="3E00FF"/>
             </a:solidFill>
           </a:ln>
         </p:spPr>
@@ -4436,11 +4413,11 @@
             <a:avLst/>
           </a:prstGeom>
           <a:solidFill>
-            <a:srgbClr val="DB3EAF"/>
+            <a:srgbClr val="3E00FF"/>
           </a:solidFill>
           <a:ln>
             <a:solidFill>
-              <a:schemeClr val="bg1"/>
+              <a:srgbClr val="3E00FF"/>
             </a:solidFill>
           </a:ln>
         </p:spPr>
@@ -4484,11 +4461,11 @@
             <a:avLst/>
           </a:prstGeom>
           <a:solidFill>
-            <a:srgbClr val="DB3EAF"/>
+            <a:srgbClr val="3E00FF"/>
           </a:solidFill>
           <a:ln>
             <a:solidFill>
-              <a:schemeClr val="bg1"/>
+              <a:srgbClr val="3E00FF"/>
             </a:solidFill>
           </a:ln>
         </p:spPr>
@@ -4541,17 +4518,11 @@
           <a:p>
             <a:r>
               <a:rPr lang="pt-BR" sz="4000" dirty="0" smtClean="0">
-                <a:solidFill>
-                  <a:schemeClr val="bg1"/>
-                </a:solidFill>
                 <a:latin typeface="Arial Rounded MT Bold" panose="020F0704030504030204" pitchFamily="34" charset="0"/>
               </a:rPr>
               <a:t>Quem somos nós ?</a:t>
             </a:r>
             <a:endParaRPr lang="pt-BR" sz="4000" dirty="0">
-              <a:solidFill>
-                <a:schemeClr val="bg1"/>
-              </a:solidFill>
               <a:latin typeface="Arial Rounded MT Bold" panose="020F0704030504030204" pitchFamily="34" charset="0"/>
             </a:endParaRPr>
           </a:p>
@@ -4573,7 +4544,7 @@
           </a:prstGeom>
           <a:ln>
             <a:solidFill>
-              <a:srgbClr val="DB3EAF"/>
+              <a:srgbClr val="3E00FF"/>
             </a:solidFill>
           </a:ln>
         </p:spPr>
@@ -4631,7 +4602,7 @@
       </p:grpSpPr>
       <p:pic>
         <p:nvPicPr>
-          <p:cNvPr id="4" name="Imagem 3"/>
+          <p:cNvPr id="2" name="Imagem 1"/>
           <p:cNvPicPr>
             <a:picLocks noChangeAspect="1"/>
           </p:cNvPicPr>
@@ -4669,6 +4640,13 @@
   <p:clrMapOvr>
     <a:masterClrMapping/>
   </p:clrMapOvr>
+  <p:timing>
+    <p:tnLst>
+      <p:par>
+        <p:cTn id="1" dur="indefinite" restart="never" nodeType="tmRoot"/>
+      </p:par>
+    </p:tnLst>
+  </p:timing>
 </p:sld>
 </file>
 
@@ -4704,7 +4682,7 @@
             <a:avLst/>
           </a:prstGeom>
           <a:solidFill>
-            <a:srgbClr val="605FAB"/>
+            <a:srgbClr val="DAD2F1"/>
           </a:solidFill>
           <a:ln>
             <a:solidFill>
@@ -4737,55 +4715,9 @@
           </a:p>
         </p:txBody>
       </p:sp>
-      <p:sp>
-        <p:nvSpPr>
-          <p:cNvPr id="27" name="CaixaDeTexto 26"/>
-          <p:cNvSpPr txBox="1"/>
-          <p:nvPr/>
-        </p:nvSpPr>
-        <p:spPr>
-          <a:xfrm>
-            <a:off x="4591049" y="5232965"/>
-            <a:ext cx="3009900" cy="584775"/>
-          </a:xfrm>
-          <a:prstGeom prst="rect">
-            <a:avLst/>
-          </a:prstGeom>
-          <a:noFill/>
-        </p:spPr>
-        <p:txBody>
-          <a:bodyPr wrap="square" rtlCol="0">
-            <a:spAutoFit/>
-          </a:bodyPr>
-          <a:lstStyle/>
-          <a:p>
-            <a:r>
-              <a:rPr lang="pt-BR" sz="3200" dirty="0" err="1" smtClean="0">
-                <a:solidFill>
-                  <a:schemeClr val="bg1"/>
-                </a:solidFill>
-              </a:rPr>
-              <a:t>Proto</a:t>
-            </a:r>
-            <a:r>
-              <a:rPr lang="pt-BR" sz="3200" dirty="0" smtClean="0">
-                <a:solidFill>
-                  <a:schemeClr val="bg1"/>
-                </a:solidFill>
-              </a:rPr>
-              <a:t> Persona</a:t>
-            </a:r>
-            <a:endParaRPr lang="pt-BR" sz="3200" dirty="0">
-              <a:solidFill>
-                <a:schemeClr val="bg1"/>
-              </a:solidFill>
-            </a:endParaRPr>
-          </a:p>
-        </p:txBody>
-      </p:sp>
       <p:pic>
         <p:nvPicPr>
-          <p:cNvPr id="6" name="Imagem 5"/>
+          <p:cNvPr id="2" name="Imagem 1"/>
           <p:cNvPicPr>
             <a:picLocks noChangeAspect="1"/>
           </p:cNvPicPr>
@@ -4805,8 +4737,8 @@
         </p:blipFill>
         <p:spPr>
           <a:xfrm>
-            <a:off x="388619" y="218598"/>
-            <a:ext cx="11414760" cy="6420803"/>
+            <a:off x="181428" y="102053"/>
+            <a:ext cx="11829143" cy="6653893"/>
           </a:xfrm>
           <a:prstGeom prst="rect">
             <a:avLst/>
@@ -4823,6 +4755,13 @@
   <p:clrMapOvr>
     <a:masterClrMapping/>
   </p:clrMapOvr>
+  <p:timing>
+    <p:tnLst>
+      <p:par>
+        <p:cTn id="1" dur="indefinite" restart="never" nodeType="tmRoot"/>
+      </p:par>
+    </p:tnLst>
+  </p:timing>
 </p:sld>
 </file>
 
@@ -4858,7 +4797,7 @@
             <a:avLst/>
           </a:prstGeom>
           <a:solidFill>
-            <a:srgbClr val="605FAB"/>
+            <a:srgbClr val="DAD2F1"/>
           </a:solidFill>
           <a:ln>
             <a:solidFill>
@@ -4921,35 +4860,19 @@
           <a:p>
             <a:pPr lvl="1"/>
             <a:r>
-              <a:rPr lang="pt-BR" dirty="0" smtClean="0">
-                <a:solidFill>
-                  <a:schemeClr val="bg1"/>
-                </a:solidFill>
-              </a:rPr>
+              <a:rPr lang="pt-BR" dirty="0" smtClean="0"/>
               <a:t>Nome </a:t>
             </a:r>
             <a:r>
-              <a:rPr lang="pt-BR" u="sng" dirty="0" smtClean="0">
-                <a:solidFill>
-                  <a:schemeClr val="bg1"/>
-                </a:solidFill>
-              </a:rPr>
+              <a:rPr lang="pt-BR" u="sng" dirty="0" smtClean="0"/>
               <a:t>:</a:t>
             </a:r>
             <a:r>
-              <a:rPr lang="pt-BR" dirty="0" smtClean="0">
-                <a:solidFill>
-                  <a:schemeClr val="bg1"/>
-                </a:solidFill>
-              </a:rPr>
+              <a:rPr lang="pt-BR" dirty="0" smtClean="0"/>
               <a:t>   Maria </a:t>
             </a:r>
             <a:r>
-              <a:rPr lang="pt-BR" dirty="0">
-                <a:solidFill>
-                  <a:schemeClr val="bg1"/>
-                </a:solidFill>
-              </a:rPr>
+              <a:rPr lang="pt-BR" dirty="0"/>
               <a:t>Aparecida</a:t>
             </a:r>
           </a:p>
@@ -4984,18 +4907,10 @@
           <a:lstStyle/>
           <a:p>
             <a:r>
-              <a:rPr lang="pt-BR" dirty="0" smtClean="0">
-                <a:solidFill>
-                  <a:schemeClr val="bg1"/>
-                </a:solidFill>
-              </a:rPr>
+              <a:rPr lang="pt-BR" dirty="0" smtClean="0"/>
               <a:t>Idade :   30</a:t>
             </a:r>
-            <a:endParaRPr lang="pt-BR" dirty="0">
-              <a:solidFill>
-                <a:schemeClr val="bg1"/>
-              </a:solidFill>
-            </a:endParaRPr>
+            <a:endParaRPr lang="pt-BR" dirty="0"/>
           </a:p>
         </p:txBody>
       </p:sp>
@@ -5024,7 +4939,7 @@
           </a:solidFill>
           <a:ln>
             <a:solidFill>
-              <a:srgbClr val="DB3EAF"/>
+              <a:srgbClr val="3E00FF"/>
             </a:solidFill>
           </a:ln>
         </p:spPr>
@@ -5077,7 +4992,7 @@
           </a:prstGeom>
           <a:ln>
             <a:solidFill>
-              <a:srgbClr val="DB3EAF"/>
+              <a:srgbClr val="3E00FF"/>
             </a:solidFill>
           </a:ln>
         </p:spPr>
@@ -5120,7 +5035,7 @@
           </a:prstGeom>
           <a:ln>
             <a:solidFill>
-              <a:srgbClr val="DB3EAF"/>
+              <a:srgbClr val="3E00FF"/>
             </a:solidFill>
           </a:ln>
         </p:spPr>
@@ -5163,7 +5078,7 @@
           </a:prstGeom>
           <a:ln>
             <a:solidFill>
-              <a:srgbClr val="DB3EAF"/>
+              <a:srgbClr val="3E00FF"/>
             </a:solidFill>
           </a:ln>
         </p:spPr>
@@ -5206,7 +5121,7 @@
           </a:prstGeom>
           <a:ln>
             <a:solidFill>
-              <a:srgbClr val="DB3EAF"/>
+              <a:srgbClr val="3E00FF"/>
             </a:solidFill>
           </a:ln>
         </p:spPr>
@@ -5360,7 +5275,7 @@
         </p:nvSpPr>
         <p:spPr>
           <a:xfrm>
-            <a:off x="6352707" y="2570656"/>
+            <a:off x="6405707" y="2570656"/>
             <a:ext cx="677718" cy="369332"/>
           </a:xfrm>
           <a:prstGeom prst="rect">
@@ -5975,6 +5890,13 @@
   <p:clrMapOvr>
     <a:masterClrMapping/>
   </p:clrMapOvr>
+  <p:timing>
+    <p:tnLst>
+      <p:par>
+        <p:cTn id="1" dur="indefinite" restart="never" nodeType="tmRoot"/>
+      </p:par>
+    </p:tnLst>
+  </p:timing>
 </p:sld>
 </file>
 
@@ -5997,69 +5919,25 @@
       </p:grpSpPr>
       <p:sp>
         <p:nvSpPr>
-          <p:cNvPr id="4" name="Título 5">
-            <a:extLst>
-              <a:ext uri="{FF2B5EF4-FFF2-40B4-BE49-F238E27FC236}">
-                <a16:creationId xmlns:a16="http://schemas.microsoft.com/office/drawing/2014/main" xmlns="" id="{FBFC9F05-42CB-4663-9738-6A830E14BF9B}"/>
-              </a:ext>
-            </a:extLst>
-          </p:cNvPr>
-          <p:cNvSpPr>
-            <a:spLocks noGrp="1"/>
-          </p:cNvSpPr>
-          <p:nvPr>
-            <p:ph type="title"/>
-          </p:nvPr>
-        </p:nvSpPr>
-        <p:spPr>
-          <a:xfrm>
-            <a:off x="672352" y="50502"/>
-            <a:ext cx="10554448" cy="660473"/>
-          </a:xfrm>
+          <p:cNvPr id="31" name="Retângulo 30"/>
+          <p:cNvSpPr/>
+          <p:nvPr/>
+        </p:nvSpPr>
+        <p:spPr>
+          <a:xfrm>
+            <a:off x="-69288" y="0"/>
+            <a:ext cx="12261287" cy="6858000"/>
+          </a:xfrm>
+          <a:prstGeom prst="rect">
+            <a:avLst/>
+          </a:prstGeom>
+          <a:solidFill>
+            <a:srgbClr val="FFFFFF"/>
+          </a:solidFill>
           <a:ln>
             <a:solidFill>
-              <a:srgbClr val="DB3EAF"/>
+              <a:srgbClr val="605FAB"/>
             </a:solidFill>
-          </a:ln>
-        </p:spPr>
-        <p:txBody>
-          <a:bodyPr>
-            <a:normAutofit fontScale="90000"/>
-          </a:bodyPr>
-          <a:lstStyle/>
-          <a:p>
-            <a:r>
-              <a:rPr lang="pt-BR" dirty="0"/>
-              <a:t>Jornada - Simplificada</a:t>
-            </a:r>
-          </a:p>
-        </p:txBody>
-      </p:sp>
-      <p:sp>
-        <p:nvSpPr>
-          <p:cNvPr id="5" name="Seta: Pentágono 39">
-            <a:extLst>
-              <a:ext uri="{FF2B5EF4-FFF2-40B4-BE49-F238E27FC236}">
-                <a16:creationId xmlns:a16="http://schemas.microsoft.com/office/drawing/2014/main" xmlns="" id="{7A5E176E-AA3B-4B6E-AE29-195BD6366D37}"/>
-              </a:ext>
-            </a:extLst>
-          </p:cNvPr>
-          <p:cNvSpPr/>
-          <p:nvPr/>
-        </p:nvSpPr>
-        <p:spPr>
-          <a:xfrm>
-            <a:off x="3054600" y="996615"/>
-            <a:ext cx="2037351" cy="573368"/>
-          </a:xfrm>
-          <a:prstGeom prst="homePlate">
-            <a:avLst/>
-          </a:prstGeom>
-          <a:solidFill>
-            <a:srgbClr val="605FAB"/>
-          </a:solidFill>
-          <a:ln>
-            <a:noFill/>
           </a:ln>
         </p:spPr>
         <p:style>
@@ -6083,62 +5961,60 @@
           <a:lstStyle/>
           <a:p>
             <a:pPr algn="ctr"/>
-            <a:r>
-              <a:rPr lang="pt-BR" sz="1400" b="1" dirty="0"/>
-              <a:t>FASES UTILIZADOR</a:t>
-            </a:r>
-          </a:p>
-        </p:txBody>
-      </p:sp>
-      <p:cxnSp>
-        <p:nvCxnSpPr>
-          <p:cNvPr id="6" name="Conector reto 5">
+            <a:endParaRPr lang="pt-BR"/>
+          </a:p>
+        </p:txBody>
+      </p:sp>
+      <p:sp>
+        <p:nvSpPr>
+          <p:cNvPr id="4" name="Título 5">
             <a:extLst>
               <a:ext uri="{FF2B5EF4-FFF2-40B4-BE49-F238E27FC236}">
-                <a16:creationId xmlns:a16="http://schemas.microsoft.com/office/drawing/2014/main" xmlns="" id="{A8AD9801-F73F-4FF4-AD2D-E89ABBB7D0F5}"/>
+                <a16:creationId xmlns:a16="http://schemas.microsoft.com/office/drawing/2014/main" xmlns="" id="{FBFC9F05-42CB-4663-9738-6A830E14BF9B}"/>
               </a:ext>
             </a:extLst>
           </p:cNvPr>
-          <p:cNvCxnSpPr>
-            <a:cxnSpLocks/>
-          </p:cNvCxnSpPr>
-          <p:nvPr/>
-        </p:nvCxnSpPr>
-        <p:spPr>
-          <a:xfrm>
-            <a:off x="672352" y="1763806"/>
-            <a:ext cx="10554448" cy="0"/>
-          </a:xfrm>
-          <a:prstGeom prst="line">
-            <a:avLst/>
-          </a:prstGeom>
+          <p:cNvSpPr>
+            <a:spLocks noGrp="1"/>
+          </p:cNvSpPr>
+          <p:nvPr>
+            <p:ph type="title"/>
+          </p:nvPr>
+        </p:nvSpPr>
+        <p:spPr>
+          <a:xfrm>
+            <a:off x="672352" y="50502"/>
+            <a:ext cx="10554448" cy="660473"/>
+          </a:xfrm>
+          <a:solidFill>
+            <a:srgbClr val="DAD2F1"/>
+          </a:solidFill>
           <a:ln>
             <a:solidFill>
-              <a:srgbClr val="32B9CD"/>
+              <a:srgbClr val="3E00FF"/>
             </a:solidFill>
           </a:ln>
         </p:spPr>
-        <p:style>
-          <a:lnRef idx="1">
-            <a:schemeClr val="accent1"/>
-          </a:lnRef>
-          <a:fillRef idx="0">
-            <a:schemeClr val="accent1"/>
-          </a:fillRef>
-          <a:effectRef idx="0">
-            <a:schemeClr val="accent1"/>
-          </a:effectRef>
-          <a:fontRef idx="minor">
-            <a:schemeClr val="tx1"/>
-          </a:fontRef>
-        </p:style>
-      </p:cxnSp>
-      <p:sp>
-        <p:nvSpPr>
-          <p:cNvPr id="7" name="Retângulo 6">
+        <p:txBody>
+          <a:bodyPr>
+            <a:normAutofit fontScale="90000"/>
+          </a:bodyPr>
+          <a:lstStyle/>
+          <a:p>
+            <a:r>
+              <a:rPr lang="pt-BR" dirty="0" smtClean="0"/>
+              <a:t>Jornada do usuário</a:t>
+            </a:r>
+            <a:endParaRPr lang="pt-BR" dirty="0"/>
+          </a:p>
+        </p:txBody>
+      </p:sp>
+      <p:sp>
+        <p:nvSpPr>
+          <p:cNvPr id="5" name="Seta: Pentágono 39">
             <a:extLst>
               <a:ext uri="{FF2B5EF4-FFF2-40B4-BE49-F238E27FC236}">
-                <a16:creationId xmlns:a16="http://schemas.microsoft.com/office/drawing/2014/main" xmlns="" id="{C2EABCFD-DF70-4F16-AD1B-2E16D3CBCDB4}"/>
+                <a16:creationId xmlns:a16="http://schemas.microsoft.com/office/drawing/2014/main" xmlns="" id="{7A5E176E-AA3B-4B6E-AE29-195BD6366D37}"/>
               </a:ext>
             </a:extLst>
           </p:cNvPr>
@@ -6147,610 +6023,14 @@
         </p:nvSpPr>
         <p:spPr>
           <a:xfrm>
-            <a:off x="3054600" y="1821034"/>
-            <a:ext cx="2037351" cy="923330"/>
-          </a:xfrm>
-          <a:prstGeom prst="rect">
-            <a:avLst/>
-          </a:prstGeom>
-        </p:spPr>
-        <p:txBody>
-          <a:bodyPr wrap="square">
-            <a:spAutoFit/>
-          </a:bodyPr>
-          <a:lstStyle/>
-          <a:p>
-            <a:pPr marL="342900" indent="-342900">
-              <a:buFont typeface="Arial" panose="020B0604020202020204" pitchFamily="34" charset="0"/>
-              <a:buChar char="•"/>
-            </a:pPr>
-            <a:r>
-              <a:rPr lang="pt-BR" sz="1800" dirty="0">
-                <a:latin typeface="Exo 2" panose="00000500000000000000" pitchFamily="50" charset="0"/>
-              </a:rPr>
-              <a:t>Ação 1</a:t>
-            </a:r>
-          </a:p>
-          <a:p>
-            <a:pPr marL="342900" indent="-342900">
-              <a:buFont typeface="Arial" panose="020B0604020202020204" pitchFamily="34" charset="0"/>
-              <a:buChar char="•"/>
-            </a:pPr>
-            <a:r>
-              <a:rPr lang="pt-BR" sz="1800" dirty="0">
-                <a:latin typeface="Exo 2" panose="00000500000000000000" pitchFamily="50" charset="0"/>
-              </a:rPr>
-              <a:t>Ação 2</a:t>
-            </a:r>
-          </a:p>
-          <a:p>
-            <a:pPr marL="342900" indent="-342900">
-              <a:buFont typeface="Arial" panose="020B0604020202020204" pitchFamily="34" charset="0"/>
-              <a:buChar char="•"/>
-            </a:pPr>
-            <a:r>
-              <a:rPr lang="pt-BR" sz="1800" dirty="0">
-                <a:latin typeface="Exo 2" panose="00000500000000000000" pitchFamily="50" charset="0"/>
-              </a:rPr>
-              <a:t>Ação 3 </a:t>
-            </a:r>
-          </a:p>
-        </p:txBody>
-      </p:sp>
-      <p:cxnSp>
-        <p:nvCxnSpPr>
-          <p:cNvPr id="8" name="Conector reto 7">
-            <a:extLst>
-              <a:ext uri="{FF2B5EF4-FFF2-40B4-BE49-F238E27FC236}">
-                <a16:creationId xmlns:a16="http://schemas.microsoft.com/office/drawing/2014/main" xmlns="" id="{B27F9872-88B9-49C8-9870-E721BFE687D5}"/>
-              </a:ext>
-            </a:extLst>
-          </p:cNvPr>
-          <p:cNvCxnSpPr>
-            <a:cxnSpLocks/>
-          </p:cNvCxnSpPr>
-          <p:nvPr/>
-        </p:nvCxnSpPr>
-        <p:spPr>
-          <a:xfrm>
-            <a:off x="672352" y="2862692"/>
-            <a:ext cx="10554448" cy="0"/>
-          </a:xfrm>
-          <a:prstGeom prst="line">
-            <a:avLst/>
-          </a:prstGeom>
-          <a:ln>
-            <a:solidFill>
-              <a:srgbClr val="32B9CD"/>
-            </a:solidFill>
-          </a:ln>
-        </p:spPr>
-        <p:style>
-          <a:lnRef idx="1">
-            <a:schemeClr val="accent1"/>
-          </a:lnRef>
-          <a:fillRef idx="0">
-            <a:schemeClr val="accent1"/>
-          </a:fillRef>
-          <a:effectRef idx="0">
-            <a:schemeClr val="accent1"/>
-          </a:effectRef>
-          <a:fontRef idx="minor">
-            <a:schemeClr val="tx1"/>
-          </a:fontRef>
-        </p:style>
-      </p:cxnSp>
-      <p:sp>
-        <p:nvSpPr>
-          <p:cNvPr id="9" name="Retângulo 8">
-            <a:extLst>
-              <a:ext uri="{FF2B5EF4-FFF2-40B4-BE49-F238E27FC236}">
-                <a16:creationId xmlns:a16="http://schemas.microsoft.com/office/drawing/2014/main" xmlns="" id="{97711B2C-6CD3-470D-AA36-229EC801CCD1}"/>
-              </a:ext>
-            </a:extLst>
-          </p:cNvPr>
-          <p:cNvSpPr/>
-          <p:nvPr/>
-        </p:nvSpPr>
-        <p:spPr>
-          <a:xfrm>
-            <a:off x="672352" y="940464"/>
-            <a:ext cx="2184972" cy="769441"/>
-          </a:xfrm>
-          <a:prstGeom prst="rect">
-            <a:avLst/>
-          </a:prstGeom>
-        </p:spPr>
-        <p:txBody>
-          <a:bodyPr wrap="square">
-            <a:spAutoFit/>
-          </a:bodyPr>
-          <a:lstStyle/>
-          <a:p>
-            <a:r>
-              <a:rPr lang="pt-BR" sz="2800" b="1" dirty="0">
-                <a:solidFill>
-                  <a:srgbClr val="E6005A"/>
-                </a:solidFill>
-                <a:latin typeface="Exo 2" panose="00000500000000000000" pitchFamily="50" charset="0"/>
-              </a:rPr>
-              <a:t>Fases </a:t>
-            </a:r>
-            <a:r>
-              <a:rPr lang="pt-BR" sz="1600" b="1" dirty="0">
-                <a:solidFill>
-                  <a:srgbClr val="E6005A"/>
-                </a:solidFill>
-                <a:latin typeface="Exo 2" panose="00000500000000000000" pitchFamily="50" charset="0"/>
-              </a:rPr>
-              <a:t>(utilizador)</a:t>
-            </a:r>
-          </a:p>
-        </p:txBody>
-      </p:sp>
-      <p:sp>
-        <p:nvSpPr>
-          <p:cNvPr id="10" name="Retângulo 9">
-            <a:extLst>
-              <a:ext uri="{FF2B5EF4-FFF2-40B4-BE49-F238E27FC236}">
-                <a16:creationId xmlns:a16="http://schemas.microsoft.com/office/drawing/2014/main" xmlns="" id="{32D853A9-2996-41B9-BDE6-AC13EBC37446}"/>
-              </a:ext>
-            </a:extLst>
-          </p:cNvPr>
-          <p:cNvSpPr/>
-          <p:nvPr/>
-        </p:nvSpPr>
-        <p:spPr>
-          <a:xfrm>
-            <a:off x="672352" y="1821034"/>
-            <a:ext cx="2184972" cy="800219"/>
-          </a:xfrm>
-          <a:prstGeom prst="rect">
-            <a:avLst/>
-          </a:prstGeom>
-        </p:spPr>
-        <p:txBody>
-          <a:bodyPr wrap="square">
-            <a:spAutoFit/>
-          </a:bodyPr>
-          <a:lstStyle/>
-          <a:p>
-            <a:r>
-              <a:rPr lang="pt-BR" sz="2800" b="1" dirty="0">
-                <a:solidFill>
-                  <a:srgbClr val="E6005A"/>
-                </a:solidFill>
-                <a:latin typeface="Exo 2" panose="00000500000000000000" pitchFamily="50" charset="0"/>
-              </a:rPr>
-              <a:t>Faz</a:t>
-            </a:r>
-          </a:p>
-          <a:p>
-            <a:r>
-              <a:rPr lang="pt-BR" sz="1800" b="1" dirty="0">
-                <a:solidFill>
-                  <a:srgbClr val="E6005A"/>
-                </a:solidFill>
-                <a:latin typeface="Exo 2" panose="00000500000000000000" pitchFamily="50" charset="0"/>
-              </a:rPr>
-              <a:t>(ações do usuário) </a:t>
-            </a:r>
-          </a:p>
-        </p:txBody>
-      </p:sp>
-      <p:pic>
-        <p:nvPicPr>
-          <p:cNvPr id="11" name="Gráfico 48" descr="Rosto surpreso sem preenchimento ">
-            <a:extLst>
-              <a:ext uri="{FF2B5EF4-FFF2-40B4-BE49-F238E27FC236}">
-                <a16:creationId xmlns:a16="http://schemas.microsoft.com/office/drawing/2014/main" xmlns="" id="{75C24F49-359D-4FB9-AF27-0954A5DF839A}"/>
-              </a:ext>
-            </a:extLst>
-          </p:cNvPr>
-          <p:cNvPicPr>
-            <a:picLocks noChangeAspect="1"/>
-          </p:cNvPicPr>
-          <p:nvPr/>
-        </p:nvPicPr>
-        <p:blipFill>
-          <a:blip r:embed="rId2">
-            <a:extLst>
-              <a:ext uri="{28A0092B-C50C-407E-A947-70E740481C1C}">
-                <a14:useLocalDpi xmlns:a14="http://schemas.microsoft.com/office/drawing/2010/main"/>
-              </a:ext>
-              <a:ext uri="{96DAC541-7B7A-43D3-8B79-37D633B846F1}">
-                <asvg:svgBlip xmlns:asvg="http://schemas.microsoft.com/office/drawing/2016/SVG/main" xmlns="" r:embed="rId4"/>
-              </a:ext>
-            </a:extLst>
-          </a:blip>
-          <a:stretch>
-            <a:fillRect/>
-          </a:stretch>
-        </p:blipFill>
-        <p:spPr>
-          <a:xfrm>
-            <a:off x="3399505" y="2874106"/>
-            <a:ext cx="914400" cy="914400"/>
-          </a:xfrm>
-          <a:prstGeom prst="rect">
-            <a:avLst/>
-          </a:prstGeom>
-        </p:spPr>
-      </p:pic>
-      <p:sp>
-        <p:nvSpPr>
-          <p:cNvPr id="12" name="Retângulo 11">
-            <a:extLst>
-              <a:ext uri="{FF2B5EF4-FFF2-40B4-BE49-F238E27FC236}">
-                <a16:creationId xmlns:a16="http://schemas.microsoft.com/office/drawing/2014/main" xmlns="" id="{6C1FC3A8-D29F-416C-8866-FFBFF6CFA21F}"/>
-              </a:ext>
-            </a:extLst>
-          </p:cNvPr>
-          <p:cNvSpPr/>
-          <p:nvPr/>
-        </p:nvSpPr>
-        <p:spPr>
-          <a:xfrm>
-            <a:off x="672352" y="2952800"/>
-            <a:ext cx="2382248" cy="830997"/>
-          </a:xfrm>
-          <a:prstGeom prst="rect">
-            <a:avLst/>
-          </a:prstGeom>
-        </p:spPr>
-        <p:txBody>
-          <a:bodyPr wrap="square">
-            <a:spAutoFit/>
-          </a:bodyPr>
-          <a:lstStyle/>
-          <a:p>
-            <a:r>
-              <a:rPr lang="pt-BR" sz="2800" b="1" dirty="0">
-                <a:solidFill>
-                  <a:srgbClr val="E6005A"/>
-                </a:solidFill>
-                <a:latin typeface="Exo 2" panose="00000500000000000000" pitchFamily="50" charset="0"/>
-              </a:rPr>
-              <a:t>Sente</a:t>
-            </a:r>
-          </a:p>
-          <a:p>
-            <a:r>
-              <a:rPr lang="pt-BR" sz="2000" b="1" dirty="0">
-                <a:solidFill>
-                  <a:srgbClr val="E6005A"/>
-                </a:solidFill>
-                <a:latin typeface="Exo 2" panose="00000500000000000000" pitchFamily="50" charset="0"/>
-              </a:rPr>
-              <a:t>(dores do usuário) </a:t>
-            </a:r>
-          </a:p>
-        </p:txBody>
-      </p:sp>
-      <p:cxnSp>
-        <p:nvCxnSpPr>
-          <p:cNvPr id="13" name="Conector reto 12">
-            <a:extLst>
-              <a:ext uri="{FF2B5EF4-FFF2-40B4-BE49-F238E27FC236}">
-                <a16:creationId xmlns:a16="http://schemas.microsoft.com/office/drawing/2014/main" xmlns="" id="{5F72E0CD-6E7D-4BE3-B122-0FDE0DB13CA3}"/>
-              </a:ext>
-            </a:extLst>
-          </p:cNvPr>
-          <p:cNvCxnSpPr>
-            <a:cxnSpLocks/>
-          </p:cNvCxnSpPr>
-          <p:nvPr/>
-        </p:nvCxnSpPr>
-        <p:spPr>
-          <a:xfrm>
-            <a:off x="672352" y="3977621"/>
-            <a:ext cx="10554448" cy="0"/>
-          </a:xfrm>
-          <a:prstGeom prst="line">
-            <a:avLst/>
-          </a:prstGeom>
-          <a:ln>
-            <a:solidFill>
-              <a:srgbClr val="32B9CD"/>
-            </a:solidFill>
-          </a:ln>
-        </p:spPr>
-        <p:style>
-          <a:lnRef idx="1">
-            <a:schemeClr val="accent1"/>
-          </a:lnRef>
-          <a:fillRef idx="0">
-            <a:schemeClr val="accent1"/>
-          </a:fillRef>
-          <a:effectRef idx="0">
-            <a:schemeClr val="accent1"/>
-          </a:effectRef>
-          <a:fontRef idx="minor">
-            <a:schemeClr val="tx1"/>
-          </a:fontRef>
-        </p:style>
-      </p:cxnSp>
-      <p:sp>
-        <p:nvSpPr>
-          <p:cNvPr id="14" name="Retângulo 13">
-            <a:extLst>
-              <a:ext uri="{FF2B5EF4-FFF2-40B4-BE49-F238E27FC236}">
-                <a16:creationId xmlns:a16="http://schemas.microsoft.com/office/drawing/2014/main" xmlns="" id="{38E392A5-D5C4-4E93-81B3-2C2DDE0DF481}"/>
-              </a:ext>
-            </a:extLst>
-          </p:cNvPr>
-          <p:cNvSpPr/>
-          <p:nvPr/>
-        </p:nvSpPr>
-        <p:spPr>
-          <a:xfrm>
-            <a:off x="3142832" y="4267456"/>
-            <a:ext cx="2037351" cy="923330"/>
-          </a:xfrm>
-          <a:prstGeom prst="rect">
-            <a:avLst/>
-          </a:prstGeom>
-        </p:spPr>
-        <p:txBody>
-          <a:bodyPr wrap="square">
-            <a:spAutoFit/>
-          </a:bodyPr>
-          <a:lstStyle/>
-          <a:p>
-            <a:pPr marL="342900" indent="-342900">
-              <a:buFont typeface="Arial" panose="020B0604020202020204" pitchFamily="34" charset="0"/>
-              <a:buChar char="•"/>
-            </a:pPr>
-            <a:r>
-              <a:rPr lang="pt-BR" sz="1800" dirty="0">
-                <a:latin typeface="Exo 2" panose="00000500000000000000" pitchFamily="50" charset="0"/>
-              </a:rPr>
-              <a:t>Pensamento 1</a:t>
-            </a:r>
-          </a:p>
-          <a:p>
-            <a:pPr marL="342900" indent="-342900">
-              <a:buFont typeface="Arial" panose="020B0604020202020204" pitchFamily="34" charset="0"/>
-              <a:buChar char="•"/>
-            </a:pPr>
-            <a:r>
-              <a:rPr lang="pt-BR" sz="1800" dirty="0">
-                <a:latin typeface="Exo 2" panose="00000500000000000000" pitchFamily="50" charset="0"/>
-              </a:rPr>
-              <a:t>Pensamento 2</a:t>
-            </a:r>
-          </a:p>
-          <a:p>
-            <a:pPr marL="342900" indent="-342900">
-              <a:buFont typeface="Arial" panose="020B0604020202020204" pitchFamily="34" charset="0"/>
-              <a:buChar char="•"/>
-            </a:pPr>
-            <a:r>
-              <a:rPr lang="pt-BR" sz="1800" dirty="0">
-                <a:latin typeface="Exo 2" panose="00000500000000000000" pitchFamily="50" charset="0"/>
-              </a:rPr>
-              <a:t>Pensamento 3</a:t>
-            </a:r>
-          </a:p>
-        </p:txBody>
-      </p:sp>
-      <p:cxnSp>
-        <p:nvCxnSpPr>
-          <p:cNvPr id="15" name="Conector reto 14">
-            <a:extLst>
-              <a:ext uri="{FF2B5EF4-FFF2-40B4-BE49-F238E27FC236}">
-                <a16:creationId xmlns:a16="http://schemas.microsoft.com/office/drawing/2014/main" xmlns="" id="{B0E22083-FDC6-42DB-8F22-3D295395355C}"/>
-              </a:ext>
-            </a:extLst>
-          </p:cNvPr>
-          <p:cNvCxnSpPr>
-            <a:cxnSpLocks/>
-          </p:cNvCxnSpPr>
-          <p:nvPr/>
-        </p:nvCxnSpPr>
-        <p:spPr>
-          <a:xfrm>
-            <a:off x="672352" y="5453500"/>
-            <a:ext cx="10554448" cy="0"/>
-          </a:xfrm>
-          <a:prstGeom prst="line">
-            <a:avLst/>
-          </a:prstGeom>
-          <a:ln>
-            <a:solidFill>
-              <a:srgbClr val="32B9CD"/>
-            </a:solidFill>
-          </a:ln>
-        </p:spPr>
-        <p:style>
-          <a:lnRef idx="1">
-            <a:schemeClr val="accent1"/>
-          </a:lnRef>
-          <a:fillRef idx="0">
-            <a:schemeClr val="accent1"/>
-          </a:fillRef>
-          <a:effectRef idx="0">
-            <a:schemeClr val="accent1"/>
-          </a:effectRef>
-          <a:fontRef idx="minor">
-            <a:schemeClr val="tx1"/>
-          </a:fontRef>
-        </p:style>
-      </p:cxnSp>
-      <p:sp>
-        <p:nvSpPr>
-          <p:cNvPr id="16" name="Retângulo 15">
-            <a:extLst>
-              <a:ext uri="{FF2B5EF4-FFF2-40B4-BE49-F238E27FC236}">
-                <a16:creationId xmlns:a16="http://schemas.microsoft.com/office/drawing/2014/main" xmlns="" id="{0AFE6135-8811-4A6E-833E-9E842EBC6675}"/>
-              </a:ext>
-            </a:extLst>
-          </p:cNvPr>
-          <p:cNvSpPr/>
-          <p:nvPr/>
-        </p:nvSpPr>
-        <p:spPr>
-          <a:xfrm>
-            <a:off x="672352" y="4267456"/>
-            <a:ext cx="2184972" cy="830997"/>
-          </a:xfrm>
-          <a:prstGeom prst="rect">
-            <a:avLst/>
-          </a:prstGeom>
-        </p:spPr>
-        <p:txBody>
-          <a:bodyPr wrap="square">
-            <a:spAutoFit/>
-          </a:bodyPr>
-          <a:lstStyle/>
-          <a:p>
-            <a:r>
-              <a:rPr lang="pt-BR" sz="2800" b="1" dirty="0">
-                <a:solidFill>
-                  <a:srgbClr val="E6005A"/>
-                </a:solidFill>
-                <a:latin typeface="Exo 2" panose="00000500000000000000" pitchFamily="50" charset="0"/>
-              </a:rPr>
-              <a:t>Pensa</a:t>
-            </a:r>
-          </a:p>
-          <a:p>
-            <a:r>
-              <a:rPr lang="pt-BR" sz="2000" b="1" dirty="0">
-                <a:solidFill>
-                  <a:srgbClr val="E6005A"/>
-                </a:solidFill>
-                <a:latin typeface="Exo 2" panose="00000500000000000000" pitchFamily="50" charset="0"/>
-              </a:rPr>
-              <a:t>(usuário) </a:t>
-            </a:r>
-          </a:p>
-        </p:txBody>
-      </p:sp>
-      <p:sp>
-        <p:nvSpPr>
-          <p:cNvPr id="17" name="Retângulo 16">
-            <a:extLst>
-              <a:ext uri="{FF2B5EF4-FFF2-40B4-BE49-F238E27FC236}">
-                <a16:creationId xmlns:a16="http://schemas.microsoft.com/office/drawing/2014/main" xmlns="" id="{11053D1A-6F2A-4187-BDDA-F16CCFD2FB8A}"/>
-              </a:ext>
-            </a:extLst>
-          </p:cNvPr>
-          <p:cNvSpPr/>
-          <p:nvPr/>
-        </p:nvSpPr>
-        <p:spPr>
-          <a:xfrm>
-            <a:off x="680374" y="5644778"/>
-            <a:ext cx="2184972" cy="800219"/>
-          </a:xfrm>
-          <a:prstGeom prst="rect">
-            <a:avLst/>
-          </a:prstGeom>
-        </p:spPr>
-        <p:txBody>
-          <a:bodyPr wrap="square">
-            <a:spAutoFit/>
-          </a:bodyPr>
-          <a:lstStyle/>
-          <a:p>
-            <a:r>
-              <a:rPr lang="pt-BR" sz="2800" b="1" dirty="0">
-                <a:solidFill>
-                  <a:srgbClr val="E6005A"/>
-                </a:solidFill>
-                <a:latin typeface="Exo 2" panose="00000500000000000000" pitchFamily="50" charset="0"/>
-              </a:rPr>
-              <a:t>Proposta</a:t>
-            </a:r>
-          </a:p>
-          <a:p>
-            <a:r>
-              <a:rPr lang="pt-BR" sz="1800" b="1" dirty="0">
-                <a:solidFill>
-                  <a:srgbClr val="E6005A"/>
-                </a:solidFill>
-                <a:latin typeface="Exo 2" panose="00000500000000000000" pitchFamily="50" charset="0"/>
-              </a:rPr>
-              <a:t>(mudanças) </a:t>
-            </a:r>
-          </a:p>
-        </p:txBody>
-      </p:sp>
-      <p:sp>
-        <p:nvSpPr>
-          <p:cNvPr id="18" name="Retângulo 17">
-            <a:extLst>
-              <a:ext uri="{FF2B5EF4-FFF2-40B4-BE49-F238E27FC236}">
-                <a16:creationId xmlns:a16="http://schemas.microsoft.com/office/drawing/2014/main" xmlns="" id="{88C73EF7-0221-4C9D-8984-1DB5E5329B28}"/>
-              </a:ext>
-            </a:extLst>
-          </p:cNvPr>
-          <p:cNvSpPr/>
-          <p:nvPr/>
-        </p:nvSpPr>
-        <p:spPr>
-          <a:xfrm>
-            <a:off x="3142831" y="5658267"/>
-            <a:ext cx="2037351" cy="646331"/>
-          </a:xfrm>
-          <a:prstGeom prst="rect">
-            <a:avLst/>
-          </a:prstGeom>
-        </p:spPr>
-        <p:txBody>
-          <a:bodyPr wrap="square">
-            <a:spAutoFit/>
-          </a:bodyPr>
-          <a:lstStyle/>
-          <a:p>
-            <a:pPr marL="342900" indent="-342900">
-              <a:buFont typeface="Arial" panose="020B0604020202020204" pitchFamily="34" charset="0"/>
-              <a:buChar char="•"/>
-            </a:pPr>
-            <a:r>
-              <a:rPr lang="pt-BR" sz="1800" dirty="0">
-                <a:latin typeface="Exo 2" panose="00000500000000000000" pitchFamily="50" charset="0"/>
-              </a:rPr>
-              <a:t>Fazer isso</a:t>
-            </a:r>
-          </a:p>
-          <a:p>
-            <a:pPr marL="342900" indent="-342900">
-              <a:buFont typeface="Arial" panose="020B0604020202020204" pitchFamily="34" charset="0"/>
-              <a:buChar char="•"/>
-            </a:pPr>
-            <a:r>
-              <a:rPr lang="pt-BR" sz="1800" dirty="0">
-                <a:latin typeface="Exo 2" panose="00000500000000000000" pitchFamily="50" charset="0"/>
-              </a:rPr>
-              <a:t>Fazer aquilo</a:t>
-            </a:r>
-          </a:p>
-        </p:txBody>
-      </p:sp>
-      <p:sp>
-        <p:nvSpPr>
-          <p:cNvPr id="19" name="Seta: Pentágono 56">
-            <a:extLst>
-              <a:ext uri="{FF2B5EF4-FFF2-40B4-BE49-F238E27FC236}">
-                <a16:creationId xmlns:a16="http://schemas.microsoft.com/office/drawing/2014/main" xmlns="" id="{7F002D23-EA12-4C3E-8CD9-8A8226298C53}"/>
-              </a:ext>
-            </a:extLst>
-          </p:cNvPr>
-          <p:cNvSpPr/>
-          <p:nvPr/>
-        </p:nvSpPr>
-        <p:spPr>
-          <a:xfrm>
-            <a:off x="5180182" y="983236"/>
+            <a:off x="3054600" y="996615"/>
             <a:ext cx="2037351" cy="573368"/>
           </a:xfrm>
           <a:prstGeom prst="homePlate">
             <a:avLst/>
           </a:prstGeom>
           <a:solidFill>
-            <a:srgbClr val="605FAB"/>
+            <a:srgbClr val="3E00FF"/>
           </a:solidFill>
           <a:ln>
             <a:noFill/>
@@ -6778,18 +6058,62 @@
           <a:p>
             <a:pPr algn="ctr"/>
             <a:r>
-              <a:rPr lang="pt-BR" sz="1400" b="1" dirty="0"/>
-              <a:t>FASES UTILIZADOR</a:t>
-            </a:r>
-          </a:p>
-        </p:txBody>
-      </p:sp>
-      <p:sp>
-        <p:nvSpPr>
-          <p:cNvPr id="20" name="Seta: Pentágono 57">
+              <a:rPr lang="pt-BR" sz="1400" b="1" dirty="0" smtClean="0"/>
+              <a:t>ACESSA O SITE</a:t>
+            </a:r>
+            <a:endParaRPr lang="pt-BR" sz="1400" b="1" dirty="0"/>
+          </a:p>
+        </p:txBody>
+      </p:sp>
+      <p:cxnSp>
+        <p:nvCxnSpPr>
+          <p:cNvPr id="6" name="Conector reto 5">
             <a:extLst>
               <a:ext uri="{FF2B5EF4-FFF2-40B4-BE49-F238E27FC236}">
-                <a16:creationId xmlns:a16="http://schemas.microsoft.com/office/drawing/2014/main" xmlns="" id="{0CCDB0CF-AE1B-43FB-B894-DA318A573E45}"/>
+                <a16:creationId xmlns:a16="http://schemas.microsoft.com/office/drawing/2014/main" xmlns="" id="{A8AD9801-F73F-4FF4-AD2D-E89ABBB7D0F5}"/>
+              </a:ext>
+            </a:extLst>
+          </p:cNvPr>
+          <p:cNvCxnSpPr>
+            <a:cxnSpLocks/>
+          </p:cNvCxnSpPr>
+          <p:nvPr/>
+        </p:nvCxnSpPr>
+        <p:spPr>
+          <a:xfrm>
+            <a:off x="672352" y="1763806"/>
+            <a:ext cx="10554448" cy="0"/>
+          </a:xfrm>
+          <a:prstGeom prst="line">
+            <a:avLst/>
+          </a:prstGeom>
+          <a:ln>
+            <a:solidFill>
+              <a:srgbClr val="3E00FF"/>
+            </a:solidFill>
+          </a:ln>
+        </p:spPr>
+        <p:style>
+          <a:lnRef idx="1">
+            <a:schemeClr val="accent1"/>
+          </a:lnRef>
+          <a:fillRef idx="0">
+            <a:schemeClr val="accent1"/>
+          </a:fillRef>
+          <a:effectRef idx="0">
+            <a:schemeClr val="accent1"/>
+          </a:effectRef>
+          <a:fontRef idx="minor">
+            <a:schemeClr val="tx1"/>
+          </a:fontRef>
+        </p:style>
+      </p:cxnSp>
+      <p:sp>
+        <p:nvSpPr>
+          <p:cNvPr id="7" name="Retângulo 6">
+            <a:extLst>
+              <a:ext uri="{FF2B5EF4-FFF2-40B4-BE49-F238E27FC236}">
+                <a16:creationId xmlns:a16="http://schemas.microsoft.com/office/drawing/2014/main" xmlns="" id="{C2EABCFD-DF70-4F16-AD1B-2E16D3CBCDB4}"/>
               </a:ext>
             </a:extLst>
           </p:cNvPr>
@@ -6798,14 +6122,489 @@
         </p:nvSpPr>
         <p:spPr>
           <a:xfrm>
-            <a:off x="7305764" y="973689"/>
+            <a:off x="2906643" y="2067812"/>
+            <a:ext cx="2125581" cy="461665"/>
+          </a:xfrm>
+          <a:prstGeom prst="rect">
+            <a:avLst/>
+          </a:prstGeom>
+        </p:spPr>
+        <p:txBody>
+          <a:bodyPr wrap="square">
+            <a:spAutoFit/>
+          </a:bodyPr>
+          <a:lstStyle/>
+          <a:p>
+            <a:pPr marL="342900" indent="-342900">
+              <a:buFont typeface="Arial" panose="020B0604020202020204" pitchFamily="34" charset="0"/>
+              <a:buChar char="•"/>
+            </a:pPr>
+            <a:r>
+              <a:rPr lang="pt-BR" sz="1200" dirty="0" smtClean="0">
+                <a:latin typeface="Exo 2" panose="00000500000000000000" pitchFamily="50" charset="0"/>
+              </a:rPr>
+              <a:t>Procura o site na </a:t>
+            </a:r>
+            <a:r>
+              <a:rPr lang="pt-BR" sz="1200" dirty="0" smtClean="0">
+                <a:latin typeface="Exo 2" panose="00000500000000000000" pitchFamily="50" charset="0"/>
+              </a:rPr>
+              <a:t>barra de pesquisa</a:t>
+            </a:r>
+          </a:p>
+        </p:txBody>
+      </p:sp>
+      <p:cxnSp>
+        <p:nvCxnSpPr>
+          <p:cNvPr id="8" name="Conector reto 7">
+            <a:extLst>
+              <a:ext uri="{FF2B5EF4-FFF2-40B4-BE49-F238E27FC236}">
+                <a16:creationId xmlns:a16="http://schemas.microsoft.com/office/drawing/2014/main" xmlns="" id="{B27F9872-88B9-49C8-9870-E721BFE687D5}"/>
+              </a:ext>
+            </a:extLst>
+          </p:cNvPr>
+          <p:cNvCxnSpPr>
+            <a:cxnSpLocks/>
+          </p:cNvCxnSpPr>
+          <p:nvPr/>
+        </p:nvCxnSpPr>
+        <p:spPr>
+          <a:xfrm>
+            <a:off x="672352" y="2862692"/>
+            <a:ext cx="10554448" cy="0"/>
+          </a:xfrm>
+          <a:prstGeom prst="line">
+            <a:avLst/>
+          </a:prstGeom>
+          <a:ln>
+            <a:solidFill>
+              <a:srgbClr val="3E00FF"/>
+            </a:solidFill>
+          </a:ln>
+        </p:spPr>
+        <p:style>
+          <a:lnRef idx="1">
+            <a:schemeClr val="accent1"/>
+          </a:lnRef>
+          <a:fillRef idx="0">
+            <a:schemeClr val="accent1"/>
+          </a:fillRef>
+          <a:effectRef idx="0">
+            <a:schemeClr val="accent1"/>
+          </a:effectRef>
+          <a:fontRef idx="minor">
+            <a:schemeClr val="tx1"/>
+          </a:fontRef>
+        </p:style>
+      </p:cxnSp>
+      <p:sp>
+        <p:nvSpPr>
+          <p:cNvPr id="9" name="Retângulo 8">
+            <a:extLst>
+              <a:ext uri="{FF2B5EF4-FFF2-40B4-BE49-F238E27FC236}">
+                <a16:creationId xmlns:a16="http://schemas.microsoft.com/office/drawing/2014/main" xmlns="" id="{97711B2C-6CD3-470D-AA36-229EC801CCD1}"/>
+              </a:ext>
+            </a:extLst>
+          </p:cNvPr>
+          <p:cNvSpPr/>
+          <p:nvPr/>
+        </p:nvSpPr>
+        <p:spPr>
+          <a:xfrm>
+            <a:off x="672352" y="940464"/>
+            <a:ext cx="2184972" cy="769441"/>
+          </a:xfrm>
+          <a:prstGeom prst="rect">
+            <a:avLst/>
+          </a:prstGeom>
+        </p:spPr>
+        <p:txBody>
+          <a:bodyPr wrap="square">
+            <a:spAutoFit/>
+          </a:bodyPr>
+          <a:lstStyle/>
+          <a:p>
+            <a:r>
+              <a:rPr lang="pt-BR" sz="2800" b="1" dirty="0">
+                <a:latin typeface="Exo 2" panose="00000500000000000000" pitchFamily="50" charset="0"/>
+              </a:rPr>
+              <a:t>Fases </a:t>
+            </a:r>
+            <a:r>
+              <a:rPr lang="pt-BR" sz="1600" b="1" dirty="0">
+                <a:latin typeface="Exo 2" panose="00000500000000000000" pitchFamily="50" charset="0"/>
+              </a:rPr>
+              <a:t>(utilizador)</a:t>
+            </a:r>
+          </a:p>
+        </p:txBody>
+      </p:sp>
+      <p:sp>
+        <p:nvSpPr>
+          <p:cNvPr id="10" name="Retângulo 9">
+            <a:extLst>
+              <a:ext uri="{FF2B5EF4-FFF2-40B4-BE49-F238E27FC236}">
+                <a16:creationId xmlns:a16="http://schemas.microsoft.com/office/drawing/2014/main" xmlns="" id="{32D853A9-2996-41B9-BDE6-AC13EBC37446}"/>
+              </a:ext>
+            </a:extLst>
+          </p:cNvPr>
+          <p:cNvSpPr/>
+          <p:nvPr/>
+        </p:nvSpPr>
+        <p:spPr>
+          <a:xfrm>
+            <a:off x="672352" y="1765933"/>
+            <a:ext cx="2184972" cy="1077218"/>
+          </a:xfrm>
+          <a:prstGeom prst="rect">
+            <a:avLst/>
+          </a:prstGeom>
+        </p:spPr>
+        <p:txBody>
+          <a:bodyPr wrap="square">
+            <a:spAutoFit/>
+          </a:bodyPr>
+          <a:lstStyle/>
+          <a:p>
+            <a:r>
+              <a:rPr lang="pt-BR" sz="2800" b="1" dirty="0">
+                <a:latin typeface="Exo 2" panose="00000500000000000000" pitchFamily="50" charset="0"/>
+              </a:rPr>
+              <a:t>Faz</a:t>
+            </a:r>
+          </a:p>
+          <a:p>
+            <a:r>
+              <a:rPr lang="pt-BR" sz="1800" b="1" dirty="0">
+                <a:latin typeface="Exo 2" panose="00000500000000000000" pitchFamily="50" charset="0"/>
+              </a:rPr>
+              <a:t>(ações do usuário) </a:t>
+            </a:r>
+          </a:p>
+        </p:txBody>
+      </p:sp>
+      <p:pic>
+        <p:nvPicPr>
+          <p:cNvPr id="11" name="Gráfico 48" descr="Rosto surpreso sem preenchimento ">
+            <a:extLst>
+              <a:ext uri="{FF2B5EF4-FFF2-40B4-BE49-F238E27FC236}">
+                <a16:creationId xmlns:a16="http://schemas.microsoft.com/office/drawing/2014/main" xmlns="" id="{75C24F49-359D-4FB9-AF27-0954A5DF839A}"/>
+              </a:ext>
+            </a:extLst>
+          </p:cNvPr>
+          <p:cNvPicPr>
+            <a:picLocks noChangeAspect="1"/>
+          </p:cNvPicPr>
+          <p:nvPr/>
+        </p:nvPicPr>
+        <p:blipFill>
+          <a:blip r:embed="rId2">
+            <a:extLst>
+              <a:ext uri="{28A0092B-C50C-407E-A947-70E740481C1C}">
+                <a14:useLocalDpi xmlns:a14="http://schemas.microsoft.com/office/drawing/2010/main"/>
+              </a:ext>
+              <a:ext uri="{96DAC541-7B7A-43D3-8B79-37D633B846F1}">
+                <asvg:svgBlip xmlns:asvg="http://schemas.microsoft.com/office/drawing/2016/SVG/main" xmlns="" r:embed="rId4"/>
+              </a:ext>
+            </a:extLst>
+          </a:blip>
+          <a:stretch>
+            <a:fillRect/>
+          </a:stretch>
+        </p:blipFill>
+        <p:spPr>
+          <a:xfrm>
+            <a:off x="12345328" y="4996300"/>
+            <a:ext cx="914400" cy="914400"/>
+          </a:xfrm>
+          <a:prstGeom prst="rect">
+            <a:avLst/>
+          </a:prstGeom>
+        </p:spPr>
+      </p:pic>
+      <p:sp>
+        <p:nvSpPr>
+          <p:cNvPr id="12" name="Retângulo 11">
+            <a:extLst>
+              <a:ext uri="{FF2B5EF4-FFF2-40B4-BE49-F238E27FC236}">
+                <a16:creationId xmlns:a16="http://schemas.microsoft.com/office/drawing/2014/main" xmlns="" id="{6C1FC3A8-D29F-416C-8866-FFBFF6CFA21F}"/>
+              </a:ext>
+            </a:extLst>
+          </p:cNvPr>
+          <p:cNvSpPr/>
+          <p:nvPr/>
+        </p:nvSpPr>
+        <p:spPr>
+          <a:xfrm>
+            <a:off x="689164" y="2887724"/>
+            <a:ext cx="2382248" cy="1138773"/>
+          </a:xfrm>
+          <a:prstGeom prst="rect">
+            <a:avLst/>
+          </a:prstGeom>
+        </p:spPr>
+        <p:txBody>
+          <a:bodyPr wrap="square">
+            <a:spAutoFit/>
+          </a:bodyPr>
+          <a:lstStyle/>
+          <a:p>
+            <a:r>
+              <a:rPr lang="pt-BR" sz="2800" b="1" dirty="0">
+                <a:latin typeface="Exo 2" panose="00000500000000000000" pitchFamily="50" charset="0"/>
+              </a:rPr>
+              <a:t>Sente</a:t>
+            </a:r>
+          </a:p>
+          <a:p>
+            <a:r>
+              <a:rPr lang="pt-BR" sz="2000" b="1" dirty="0">
+                <a:latin typeface="Exo 2" panose="00000500000000000000" pitchFamily="50" charset="0"/>
+              </a:rPr>
+              <a:t>(dores do usuário) </a:t>
+            </a:r>
+          </a:p>
+        </p:txBody>
+      </p:sp>
+      <p:cxnSp>
+        <p:nvCxnSpPr>
+          <p:cNvPr id="13" name="Conector reto 12">
+            <a:extLst>
+              <a:ext uri="{FF2B5EF4-FFF2-40B4-BE49-F238E27FC236}">
+                <a16:creationId xmlns:a16="http://schemas.microsoft.com/office/drawing/2014/main" xmlns="" id="{5F72E0CD-6E7D-4BE3-B122-0FDE0DB13CA3}"/>
+              </a:ext>
+            </a:extLst>
+          </p:cNvPr>
+          <p:cNvCxnSpPr>
+            <a:cxnSpLocks/>
+          </p:cNvCxnSpPr>
+          <p:nvPr/>
+        </p:nvCxnSpPr>
+        <p:spPr>
+          <a:xfrm>
+            <a:off x="672352" y="3977621"/>
+            <a:ext cx="10554448" cy="0"/>
+          </a:xfrm>
+          <a:prstGeom prst="line">
+            <a:avLst/>
+          </a:prstGeom>
+          <a:ln>
+            <a:solidFill>
+              <a:srgbClr val="3E00FF"/>
+            </a:solidFill>
+          </a:ln>
+        </p:spPr>
+        <p:style>
+          <a:lnRef idx="1">
+            <a:schemeClr val="accent1"/>
+          </a:lnRef>
+          <a:fillRef idx="0">
+            <a:schemeClr val="accent1"/>
+          </a:fillRef>
+          <a:effectRef idx="0">
+            <a:schemeClr val="accent1"/>
+          </a:effectRef>
+          <a:fontRef idx="minor">
+            <a:schemeClr val="tx1"/>
+          </a:fontRef>
+        </p:style>
+      </p:cxnSp>
+      <p:sp>
+        <p:nvSpPr>
+          <p:cNvPr id="14" name="Retângulo 13">
+            <a:extLst>
+              <a:ext uri="{FF2B5EF4-FFF2-40B4-BE49-F238E27FC236}">
+                <a16:creationId xmlns:a16="http://schemas.microsoft.com/office/drawing/2014/main" xmlns="" id="{38E392A5-D5C4-4E93-81B3-2C2DDE0DF481}"/>
+              </a:ext>
+            </a:extLst>
+          </p:cNvPr>
+          <p:cNvSpPr/>
+          <p:nvPr/>
+        </p:nvSpPr>
+        <p:spPr>
+          <a:xfrm>
+            <a:off x="2857324" y="4310871"/>
+            <a:ext cx="2037351" cy="461665"/>
+          </a:xfrm>
+          <a:prstGeom prst="rect">
+            <a:avLst/>
+          </a:prstGeom>
+        </p:spPr>
+        <p:txBody>
+          <a:bodyPr wrap="square">
+            <a:spAutoFit/>
+          </a:bodyPr>
+          <a:lstStyle/>
+          <a:p>
+            <a:pPr marL="342900" indent="-342900">
+              <a:buFont typeface="Arial" panose="020B0604020202020204" pitchFamily="34" charset="0"/>
+              <a:buChar char="•"/>
+            </a:pPr>
+            <a:r>
+              <a:rPr lang="pt-BR" sz="1200" dirty="0" smtClean="0">
+                <a:latin typeface="Exo 2" panose="00000500000000000000" pitchFamily="50" charset="0"/>
+              </a:rPr>
+              <a:t>“Como deve ser esse site” </a:t>
+            </a:r>
+            <a:endParaRPr lang="pt-BR" sz="1200" dirty="0">
+              <a:latin typeface="Exo 2" panose="00000500000000000000" pitchFamily="50" charset="0"/>
+            </a:endParaRPr>
+          </a:p>
+        </p:txBody>
+      </p:sp>
+      <p:cxnSp>
+        <p:nvCxnSpPr>
+          <p:cNvPr id="15" name="Conector reto 14">
+            <a:extLst>
+              <a:ext uri="{FF2B5EF4-FFF2-40B4-BE49-F238E27FC236}">
+                <a16:creationId xmlns:a16="http://schemas.microsoft.com/office/drawing/2014/main" xmlns="" id="{B0E22083-FDC6-42DB-8F22-3D295395355C}"/>
+              </a:ext>
+            </a:extLst>
+          </p:cNvPr>
+          <p:cNvCxnSpPr>
+            <a:cxnSpLocks/>
+          </p:cNvCxnSpPr>
+          <p:nvPr/>
+        </p:nvCxnSpPr>
+        <p:spPr>
+          <a:xfrm>
+            <a:off x="672352" y="5453500"/>
+            <a:ext cx="10554448" cy="0"/>
+          </a:xfrm>
+          <a:prstGeom prst="line">
+            <a:avLst/>
+          </a:prstGeom>
+          <a:ln>
+            <a:solidFill>
+              <a:srgbClr val="3E00FF"/>
+            </a:solidFill>
+          </a:ln>
+        </p:spPr>
+        <p:style>
+          <a:lnRef idx="1">
+            <a:schemeClr val="accent1"/>
+          </a:lnRef>
+          <a:fillRef idx="0">
+            <a:schemeClr val="accent1"/>
+          </a:fillRef>
+          <a:effectRef idx="0">
+            <a:schemeClr val="accent1"/>
+          </a:effectRef>
+          <a:fontRef idx="minor">
+            <a:schemeClr val="tx1"/>
+          </a:fontRef>
+        </p:style>
+      </p:cxnSp>
+      <p:sp>
+        <p:nvSpPr>
+          <p:cNvPr id="16" name="Retângulo 15">
+            <a:extLst>
+              <a:ext uri="{FF2B5EF4-FFF2-40B4-BE49-F238E27FC236}">
+                <a16:creationId xmlns:a16="http://schemas.microsoft.com/office/drawing/2014/main" xmlns="" id="{0AFE6135-8811-4A6E-833E-9E842EBC6675}"/>
+              </a:ext>
+            </a:extLst>
+          </p:cNvPr>
+          <p:cNvSpPr/>
+          <p:nvPr/>
+        </p:nvSpPr>
+        <p:spPr>
+          <a:xfrm>
+            <a:off x="672352" y="4267456"/>
+            <a:ext cx="2184972" cy="830997"/>
+          </a:xfrm>
+          <a:prstGeom prst="rect">
+            <a:avLst/>
+          </a:prstGeom>
+        </p:spPr>
+        <p:txBody>
+          <a:bodyPr wrap="square">
+            <a:spAutoFit/>
+          </a:bodyPr>
+          <a:lstStyle/>
+          <a:p>
+            <a:r>
+              <a:rPr lang="pt-BR" sz="2800" b="1" dirty="0">
+                <a:latin typeface="Exo 2" panose="00000500000000000000" pitchFamily="50" charset="0"/>
+              </a:rPr>
+              <a:t>Pensa</a:t>
+            </a:r>
+          </a:p>
+          <a:p>
+            <a:r>
+              <a:rPr lang="pt-BR" sz="2000" b="1" dirty="0">
+                <a:latin typeface="Exo 2" panose="00000500000000000000" pitchFamily="50" charset="0"/>
+              </a:rPr>
+              <a:t>(usuário) </a:t>
+            </a:r>
+          </a:p>
+        </p:txBody>
+      </p:sp>
+      <p:sp>
+        <p:nvSpPr>
+          <p:cNvPr id="17" name="Retângulo 16">
+            <a:extLst>
+              <a:ext uri="{FF2B5EF4-FFF2-40B4-BE49-F238E27FC236}">
+                <a16:creationId xmlns:a16="http://schemas.microsoft.com/office/drawing/2014/main" xmlns="" id="{11053D1A-6F2A-4187-BDDA-F16CCFD2FB8A}"/>
+              </a:ext>
+            </a:extLst>
+          </p:cNvPr>
+          <p:cNvSpPr/>
+          <p:nvPr/>
+        </p:nvSpPr>
+        <p:spPr>
+          <a:xfrm>
+            <a:off x="680374" y="5644778"/>
+            <a:ext cx="2184972" cy="800219"/>
+          </a:xfrm>
+          <a:prstGeom prst="rect">
+            <a:avLst/>
+          </a:prstGeom>
+        </p:spPr>
+        <p:txBody>
+          <a:bodyPr wrap="square">
+            <a:spAutoFit/>
+          </a:bodyPr>
+          <a:lstStyle/>
+          <a:p>
+            <a:r>
+              <a:rPr lang="pt-BR" sz="2800" b="1" dirty="0">
+                <a:latin typeface="Exo 2" panose="00000500000000000000" pitchFamily="50" charset="0"/>
+              </a:rPr>
+              <a:t>Proposta</a:t>
+            </a:r>
+          </a:p>
+          <a:p>
+            <a:r>
+              <a:rPr lang="pt-BR" sz="1800" b="1" dirty="0">
+                <a:latin typeface="Exo 2" panose="00000500000000000000" pitchFamily="50" charset="0"/>
+              </a:rPr>
+              <a:t>(mudanças) </a:t>
+            </a:r>
+          </a:p>
+        </p:txBody>
+      </p:sp>
+      <p:sp>
+        <p:nvSpPr>
+          <p:cNvPr id="19" name="Seta: Pentágono 56">
+            <a:extLst>
+              <a:ext uri="{FF2B5EF4-FFF2-40B4-BE49-F238E27FC236}">
+                <a16:creationId xmlns:a16="http://schemas.microsoft.com/office/drawing/2014/main" xmlns="" id="{7F002D23-EA12-4C3E-8CD9-8A8226298C53}"/>
+              </a:ext>
+            </a:extLst>
+          </p:cNvPr>
+          <p:cNvSpPr/>
+          <p:nvPr/>
+        </p:nvSpPr>
+        <p:spPr>
+          <a:xfrm>
+            <a:off x="5180182" y="983236"/>
             <a:ext cx="2037351" cy="573368"/>
           </a:xfrm>
           <a:prstGeom prst="homePlate">
             <a:avLst/>
           </a:prstGeom>
           <a:solidFill>
-            <a:srgbClr val="605FAB"/>
+            <a:srgbClr val="3E00FF"/>
           </a:solidFill>
           <a:ln>
             <a:noFill/>
@@ -6833,18 +6632,19 @@
           <a:p>
             <a:pPr algn="ctr"/>
             <a:r>
-              <a:rPr lang="pt-BR" sz="1400" b="1" dirty="0"/>
-              <a:t>FASES UTILIZADOR</a:t>
-            </a:r>
-          </a:p>
-        </p:txBody>
-      </p:sp>
-      <p:sp>
-        <p:nvSpPr>
-          <p:cNvPr id="21" name="Seta: Pentágono 58">
+              <a:rPr lang="pt-BR" sz="1400" b="1" dirty="0" smtClean="0"/>
+              <a:t>REALIZA O CADASTRO</a:t>
+            </a:r>
+            <a:endParaRPr lang="pt-BR" sz="1400" b="1" dirty="0"/>
+          </a:p>
+        </p:txBody>
+      </p:sp>
+      <p:sp>
+        <p:nvSpPr>
+          <p:cNvPr id="20" name="Seta: Pentágono 57">
             <a:extLst>
               <a:ext uri="{FF2B5EF4-FFF2-40B4-BE49-F238E27FC236}">
-                <a16:creationId xmlns:a16="http://schemas.microsoft.com/office/drawing/2014/main" xmlns="" id="{0BB13E62-EB58-4BCD-B51B-6701A40573A6}"/>
+                <a16:creationId xmlns:a16="http://schemas.microsoft.com/office/drawing/2014/main" xmlns="" id="{0CCDB0CF-AE1B-43FB-B894-DA318A573E45}"/>
               </a:ext>
             </a:extLst>
           </p:cNvPr>
@@ -6853,14 +6653,14 @@
         </p:nvSpPr>
         <p:spPr>
           <a:xfrm>
-            <a:off x="9431346" y="973689"/>
+            <a:off x="7305764" y="973689"/>
             <a:ext cx="2037351" cy="573368"/>
           </a:xfrm>
           <a:prstGeom prst="homePlate">
             <a:avLst/>
           </a:prstGeom>
           <a:solidFill>
-            <a:srgbClr val="605FAB"/>
+            <a:srgbClr val="3E00FF"/>
           </a:solidFill>
           <a:ln>
             <a:noFill/>
@@ -6888,9 +6688,66 @@
           <a:p>
             <a:pPr algn="ctr"/>
             <a:r>
-              <a:rPr lang="pt-BR" sz="1400" b="1" dirty="0"/>
-              <a:t>FASES UTILIZADOR</a:t>
-            </a:r>
+              <a:rPr lang="pt-BR" sz="1400" b="1" dirty="0" smtClean="0"/>
+              <a:t>REALIZA O LOGIN</a:t>
+            </a:r>
+            <a:endParaRPr lang="pt-BR" sz="1400" b="1" dirty="0"/>
+          </a:p>
+        </p:txBody>
+      </p:sp>
+      <p:sp>
+        <p:nvSpPr>
+          <p:cNvPr id="21" name="Seta: Pentágono 58">
+            <a:extLst>
+              <a:ext uri="{FF2B5EF4-FFF2-40B4-BE49-F238E27FC236}">
+                <a16:creationId xmlns:a16="http://schemas.microsoft.com/office/drawing/2014/main" xmlns="" id="{0BB13E62-EB58-4BCD-B51B-6701A40573A6}"/>
+              </a:ext>
+            </a:extLst>
+          </p:cNvPr>
+          <p:cNvSpPr/>
+          <p:nvPr/>
+        </p:nvSpPr>
+        <p:spPr>
+          <a:xfrm>
+            <a:off x="9431346" y="973689"/>
+            <a:ext cx="2037351" cy="573368"/>
+          </a:xfrm>
+          <a:prstGeom prst="homePlate">
+            <a:avLst/>
+          </a:prstGeom>
+          <a:solidFill>
+            <a:srgbClr val="3E00FF"/>
+          </a:solidFill>
+          <a:ln>
+            <a:noFill/>
+          </a:ln>
+        </p:spPr>
+        <p:style>
+          <a:lnRef idx="2">
+            <a:schemeClr val="accent1">
+              <a:shade val="50000"/>
+            </a:schemeClr>
+          </a:lnRef>
+          <a:fillRef idx="1">
+            <a:schemeClr val="accent1"/>
+          </a:fillRef>
+          <a:effectRef idx="0">
+            <a:schemeClr val="accent1"/>
+          </a:effectRef>
+          <a:fontRef idx="minor">
+            <a:schemeClr val="lt1"/>
+          </a:fontRef>
+        </p:style>
+        <p:txBody>
+          <a:bodyPr rtlCol="0" anchor="ctr"/>
+          <a:lstStyle/>
+          <a:p>
+            <a:pPr algn="ctr"/>
+            <a:r>
+              <a:rPr lang="pt-BR" sz="1400" b="1" dirty="0" smtClean="0"/>
+              <a:t>ACESSAR A DASHBOARD</a:t>
+            </a:r>
+            <a:endParaRPr lang="pt-BR" sz="1400" b="1" dirty="0"/>
           </a:p>
         </p:txBody>
       </p:sp>
@@ -7120,7 +6977,7 @@
         </p:blipFill>
         <p:spPr>
           <a:xfrm>
-            <a:off x="12345328" y="1958628"/>
+            <a:off x="3512233" y="2983529"/>
             <a:ext cx="914400" cy="914400"/>
           </a:xfrm>
           <a:prstGeom prst="rect">
@@ -7245,6 +7102,740 @@
           </a:prstGeom>
         </p:spPr>
       </p:pic>
+      <p:sp>
+        <p:nvSpPr>
+          <p:cNvPr id="33" name="Retângulo 32">
+            <a:extLst>
+              <a:ext uri="{FF2B5EF4-FFF2-40B4-BE49-F238E27FC236}">
+                <a16:creationId xmlns:a16="http://schemas.microsoft.com/office/drawing/2014/main" xmlns="" id="{C2EABCFD-DF70-4F16-AD1B-2E16D3CBCDB4}"/>
+              </a:ext>
+            </a:extLst>
+          </p:cNvPr>
+          <p:cNvSpPr/>
+          <p:nvPr/>
+        </p:nvSpPr>
+        <p:spPr>
+          <a:xfrm>
+            <a:off x="5081543" y="1735796"/>
+            <a:ext cx="2496969" cy="1200329"/>
+          </a:xfrm>
+          <a:prstGeom prst="rect">
+            <a:avLst/>
+          </a:prstGeom>
+        </p:spPr>
+        <p:txBody>
+          <a:bodyPr wrap="square">
+            <a:spAutoFit/>
+          </a:bodyPr>
+          <a:lstStyle/>
+          <a:p>
+            <a:pPr marL="342900" indent="-342900">
+              <a:buFont typeface="Arial" panose="020B0604020202020204" pitchFamily="34" charset="0"/>
+              <a:buChar char="•"/>
+            </a:pPr>
+            <a:r>
+              <a:rPr lang="pt-BR" sz="1200" dirty="0" smtClean="0">
+                <a:latin typeface="Exo 2" panose="00000500000000000000" pitchFamily="50" charset="0"/>
+              </a:rPr>
+              <a:t>Inseri</a:t>
+            </a:r>
+            <a:r>
+              <a:rPr lang="pt-BR" sz="1200" dirty="0" smtClean="0">
+                <a:latin typeface="Exo 2" panose="00000500000000000000" pitchFamily="50" charset="0"/>
+              </a:rPr>
+              <a:t> Dados de Entrada</a:t>
+            </a:r>
+            <a:endParaRPr lang="pt-BR" sz="1200" dirty="0">
+              <a:latin typeface="Exo 2" panose="00000500000000000000" pitchFamily="50" charset="0"/>
+            </a:endParaRPr>
+          </a:p>
+          <a:p>
+            <a:pPr marL="342900" indent="-342900">
+              <a:buFont typeface="Arial" panose="020B0604020202020204" pitchFamily="34" charset="0"/>
+              <a:buChar char="•"/>
+            </a:pPr>
+            <a:r>
+              <a:rPr lang="pt-BR" sz="1200" dirty="0" smtClean="0">
+                <a:latin typeface="Exo 2" panose="00000500000000000000" pitchFamily="50" charset="0"/>
+              </a:rPr>
+              <a:t>Inseri Dados da Empresa </a:t>
+            </a:r>
+          </a:p>
+          <a:p>
+            <a:pPr marL="342900" indent="-342900">
+              <a:buFont typeface="Arial" panose="020B0604020202020204" pitchFamily="34" charset="0"/>
+              <a:buChar char="•"/>
+            </a:pPr>
+            <a:r>
+              <a:rPr lang="pt-BR" sz="1200" dirty="0" smtClean="0">
+                <a:latin typeface="Exo 2" panose="00000500000000000000" pitchFamily="50" charset="0"/>
+              </a:rPr>
+              <a:t>Inseri Dados de Endereço</a:t>
+            </a:r>
+          </a:p>
+        </p:txBody>
+      </p:sp>
+      <p:sp>
+        <p:nvSpPr>
+          <p:cNvPr id="34" name="Retângulo 33">
+            <a:extLst>
+              <a:ext uri="{FF2B5EF4-FFF2-40B4-BE49-F238E27FC236}">
+                <a16:creationId xmlns:a16="http://schemas.microsoft.com/office/drawing/2014/main" xmlns="" id="{C2EABCFD-DF70-4F16-AD1B-2E16D3CBCDB4}"/>
+              </a:ext>
+            </a:extLst>
+          </p:cNvPr>
+          <p:cNvSpPr/>
+          <p:nvPr/>
+        </p:nvSpPr>
+        <p:spPr>
+          <a:xfrm>
+            <a:off x="7219661" y="1984507"/>
+            <a:ext cx="2496969" cy="461665"/>
+          </a:xfrm>
+          <a:prstGeom prst="rect">
+            <a:avLst/>
+          </a:prstGeom>
+        </p:spPr>
+        <p:txBody>
+          <a:bodyPr wrap="square">
+            <a:spAutoFit/>
+          </a:bodyPr>
+          <a:lstStyle/>
+          <a:p>
+            <a:pPr marL="342900" indent="-342900">
+              <a:buFont typeface="Arial" panose="020B0604020202020204" pitchFamily="34" charset="0"/>
+              <a:buChar char="•"/>
+            </a:pPr>
+            <a:r>
+              <a:rPr lang="pt-BR" sz="1200" dirty="0" smtClean="0">
+                <a:latin typeface="Exo 2" panose="00000500000000000000" pitchFamily="50" charset="0"/>
+              </a:rPr>
+              <a:t>Inseri o E-mail</a:t>
+            </a:r>
+          </a:p>
+          <a:p>
+            <a:pPr marL="342900" indent="-342900">
+              <a:buFont typeface="Arial" panose="020B0604020202020204" pitchFamily="34" charset="0"/>
+              <a:buChar char="•"/>
+            </a:pPr>
+            <a:r>
+              <a:rPr lang="pt-BR" sz="1200" dirty="0" smtClean="0">
+                <a:latin typeface="Exo 2" panose="00000500000000000000" pitchFamily="50" charset="0"/>
+              </a:rPr>
+              <a:t>Inseri a Senha</a:t>
+            </a:r>
+            <a:endParaRPr lang="pt-BR" sz="1200" dirty="0" smtClean="0">
+              <a:latin typeface="Exo 2" panose="00000500000000000000" pitchFamily="50" charset="0"/>
+            </a:endParaRPr>
+          </a:p>
+        </p:txBody>
+      </p:sp>
+      <p:sp>
+        <p:nvSpPr>
+          <p:cNvPr id="36" name="Retângulo 35">
+            <a:extLst>
+              <a:ext uri="{FF2B5EF4-FFF2-40B4-BE49-F238E27FC236}">
+                <a16:creationId xmlns:a16="http://schemas.microsoft.com/office/drawing/2014/main" xmlns="" id="{C2EABCFD-DF70-4F16-AD1B-2E16D3CBCDB4}"/>
+              </a:ext>
+            </a:extLst>
+          </p:cNvPr>
+          <p:cNvSpPr/>
+          <p:nvPr/>
+        </p:nvSpPr>
+        <p:spPr>
+          <a:xfrm>
+            <a:off x="9343115" y="1807015"/>
+            <a:ext cx="2496969" cy="1015663"/>
+          </a:xfrm>
+          <a:prstGeom prst="rect">
+            <a:avLst/>
+          </a:prstGeom>
+        </p:spPr>
+        <p:txBody>
+          <a:bodyPr wrap="square">
+            <a:spAutoFit/>
+          </a:bodyPr>
+          <a:lstStyle/>
+          <a:p>
+            <a:pPr marL="342900" indent="-342900">
+              <a:buFont typeface="Arial" panose="020B0604020202020204" pitchFamily="34" charset="0"/>
+              <a:buChar char="•"/>
+            </a:pPr>
+            <a:r>
+              <a:rPr lang="pt-BR" sz="1200" dirty="0" smtClean="0">
+                <a:latin typeface="Exo 2" panose="00000500000000000000" pitchFamily="50" charset="0"/>
+              </a:rPr>
+              <a:t>Fazer o cadastro de produto</a:t>
+            </a:r>
+          </a:p>
+          <a:p>
+            <a:pPr marL="342900" indent="-342900">
+              <a:buFont typeface="Arial" panose="020B0604020202020204" pitchFamily="34" charset="0"/>
+              <a:buChar char="•"/>
+            </a:pPr>
+            <a:r>
+              <a:rPr lang="pt-BR" sz="1200" dirty="0" smtClean="0">
+                <a:latin typeface="Exo 2" panose="00000500000000000000" pitchFamily="50" charset="0"/>
+              </a:rPr>
+              <a:t>Fazer controle de estoque</a:t>
+            </a:r>
+          </a:p>
+          <a:p>
+            <a:pPr marL="342900" indent="-342900">
+              <a:buFont typeface="Arial" panose="020B0604020202020204" pitchFamily="34" charset="0"/>
+              <a:buChar char="•"/>
+            </a:pPr>
+            <a:r>
+              <a:rPr lang="pt-BR" sz="1200" dirty="0" smtClean="0">
+                <a:latin typeface="Exo 2" panose="00000500000000000000" pitchFamily="50" charset="0"/>
+              </a:rPr>
+              <a:t>Realizar Venda</a:t>
+            </a:r>
+            <a:endParaRPr lang="pt-BR" sz="1200" dirty="0" smtClean="0">
+              <a:latin typeface="Exo 2" panose="00000500000000000000" pitchFamily="50" charset="0"/>
+            </a:endParaRPr>
+          </a:p>
+        </p:txBody>
+      </p:sp>
+      <p:pic>
+        <p:nvPicPr>
+          <p:cNvPr id="37" name="Gráfico 78" descr="Rosto neutro sem preenchimento ">
+            <a:extLst>
+              <a:ext uri="{FF2B5EF4-FFF2-40B4-BE49-F238E27FC236}">
+                <a16:creationId xmlns:a16="http://schemas.microsoft.com/office/drawing/2014/main" xmlns="" id="{D1E4C346-AACD-4ABA-9540-6EE52F5A8371}"/>
+              </a:ext>
+            </a:extLst>
+          </p:cNvPr>
+          <p:cNvPicPr>
+            <a:picLocks noChangeAspect="1"/>
+          </p:cNvPicPr>
+          <p:nvPr/>
+        </p:nvPicPr>
+        <p:blipFill>
+          <a:blip r:embed="rId15">
+            <a:extLst>
+              <a:ext uri="{28A0092B-C50C-407E-A947-70E740481C1C}">
+                <a14:useLocalDpi xmlns:a14="http://schemas.microsoft.com/office/drawing/2010/main"/>
+              </a:ext>
+              <a:ext uri="{96DAC541-7B7A-43D3-8B79-37D633B846F1}">
+                <asvg:svgBlip xmlns:asvg="http://schemas.microsoft.com/office/drawing/2016/SVG/main" xmlns="" r:embed="rId16"/>
+              </a:ext>
+            </a:extLst>
+          </a:blip>
+          <a:stretch>
+            <a:fillRect/>
+          </a:stretch>
+        </p:blipFill>
+        <p:spPr>
+          <a:xfrm>
+            <a:off x="12311690" y="1966677"/>
+            <a:ext cx="914400" cy="914400"/>
+          </a:xfrm>
+          <a:prstGeom prst="rect">
+            <a:avLst/>
+          </a:prstGeom>
+        </p:spPr>
+      </p:pic>
+      <p:pic>
+        <p:nvPicPr>
+          <p:cNvPr id="39" name="Gráfico 77" descr="Rosto sorridente sem preenchimento ">
+            <a:extLst>
+              <a:ext uri="{FF2B5EF4-FFF2-40B4-BE49-F238E27FC236}">
+                <a16:creationId xmlns:a16="http://schemas.microsoft.com/office/drawing/2014/main" xmlns="" id="{C0027FE7-FDE9-473F-ADAF-1281A7BD417D}"/>
+              </a:ext>
+            </a:extLst>
+          </p:cNvPr>
+          <p:cNvPicPr>
+            <a:picLocks noChangeAspect="1"/>
+          </p:cNvPicPr>
+          <p:nvPr/>
+        </p:nvPicPr>
+        <p:blipFill>
+          <a:blip r:embed="rId13">
+            <a:extLst>
+              <a:ext uri="{28A0092B-C50C-407E-A947-70E740481C1C}">
+                <a14:useLocalDpi xmlns:a14="http://schemas.microsoft.com/office/drawing/2010/main"/>
+              </a:ext>
+              <a:ext uri="{96DAC541-7B7A-43D3-8B79-37D633B846F1}">
+                <asvg:svgBlip xmlns:asvg="http://schemas.microsoft.com/office/drawing/2016/SVG/main" xmlns="" r:embed="rId14"/>
+              </a:ext>
+            </a:extLst>
+          </a:blip>
+          <a:stretch>
+            <a:fillRect/>
+          </a:stretch>
+        </p:blipFill>
+        <p:spPr>
+          <a:xfrm>
+            <a:off x="7867239" y="2999911"/>
+            <a:ext cx="914400" cy="914400"/>
+          </a:xfrm>
+          <a:prstGeom prst="rect">
+            <a:avLst/>
+          </a:prstGeom>
+        </p:spPr>
+      </p:pic>
+      <p:pic>
+        <p:nvPicPr>
+          <p:cNvPr id="40" name="Gráfico 79" descr="Rosto triste sem preenchimento ">
+            <a:extLst>
+              <a:ext uri="{FF2B5EF4-FFF2-40B4-BE49-F238E27FC236}">
+                <a16:creationId xmlns:a16="http://schemas.microsoft.com/office/drawing/2014/main" xmlns="" id="{5E638E41-AE51-4FCB-918B-4D93C61F3350}"/>
+              </a:ext>
+            </a:extLst>
+          </p:cNvPr>
+          <p:cNvPicPr>
+            <a:picLocks noChangeAspect="1"/>
+          </p:cNvPicPr>
+          <p:nvPr/>
+        </p:nvPicPr>
+        <p:blipFill>
+          <a:blip r:embed="rId17">
+            <a:extLst>
+              <a:ext uri="{28A0092B-C50C-407E-A947-70E740481C1C}">
+                <a14:useLocalDpi xmlns:a14="http://schemas.microsoft.com/office/drawing/2010/main"/>
+              </a:ext>
+              <a:ext uri="{96DAC541-7B7A-43D3-8B79-37D633B846F1}">
+                <asvg:svgBlip xmlns:asvg="http://schemas.microsoft.com/office/drawing/2016/SVG/main" xmlns="" r:embed="rId18"/>
+              </a:ext>
+            </a:extLst>
+          </a:blip>
+          <a:stretch>
+            <a:fillRect/>
+          </a:stretch>
+        </p:blipFill>
+        <p:spPr>
+          <a:xfrm>
+            <a:off x="5741657" y="2975699"/>
+            <a:ext cx="914400" cy="914400"/>
+          </a:xfrm>
+          <a:prstGeom prst="rect">
+            <a:avLst/>
+          </a:prstGeom>
+        </p:spPr>
+      </p:pic>
+      <p:pic>
+        <p:nvPicPr>
+          <p:cNvPr id="41" name="Gráfico 80" descr="Rosto sorrindo sem preenchimento ">
+            <a:extLst>
+              <a:ext uri="{FF2B5EF4-FFF2-40B4-BE49-F238E27FC236}">
+                <a16:creationId xmlns:a16="http://schemas.microsoft.com/office/drawing/2014/main" xmlns="" id="{72C5BDBD-5C3F-4A7A-A02D-0828B0C77AEA}"/>
+              </a:ext>
+            </a:extLst>
+          </p:cNvPr>
+          <p:cNvPicPr>
+            <a:picLocks noChangeAspect="1"/>
+          </p:cNvPicPr>
+          <p:nvPr/>
+        </p:nvPicPr>
+        <p:blipFill>
+          <a:blip r:embed="rId19">
+            <a:extLst>
+              <a:ext uri="{28A0092B-C50C-407E-A947-70E740481C1C}">
+                <a14:useLocalDpi xmlns:a14="http://schemas.microsoft.com/office/drawing/2010/main"/>
+              </a:ext>
+              <a:ext uri="{96DAC541-7B7A-43D3-8B79-37D633B846F1}">
+                <asvg:svgBlip xmlns:asvg="http://schemas.microsoft.com/office/drawing/2016/SVG/main" xmlns="" r:embed="rId20"/>
+              </a:ext>
+            </a:extLst>
+          </a:blip>
+          <a:stretch>
+            <a:fillRect/>
+          </a:stretch>
+        </p:blipFill>
+        <p:spPr>
+          <a:xfrm>
+            <a:off x="9992821" y="2973565"/>
+            <a:ext cx="914400" cy="914400"/>
+          </a:xfrm>
+          <a:prstGeom prst="rect">
+            <a:avLst/>
+          </a:prstGeom>
+        </p:spPr>
+      </p:pic>
+      <p:sp>
+        <p:nvSpPr>
+          <p:cNvPr id="42" name="Retângulo 41">
+            <a:extLst>
+              <a:ext uri="{FF2B5EF4-FFF2-40B4-BE49-F238E27FC236}">
+                <a16:creationId xmlns:a16="http://schemas.microsoft.com/office/drawing/2014/main" xmlns="" id="{38E392A5-D5C4-4E93-81B3-2C2DDE0DF481}"/>
+              </a:ext>
+            </a:extLst>
+          </p:cNvPr>
+          <p:cNvSpPr/>
+          <p:nvPr/>
+        </p:nvSpPr>
+        <p:spPr>
+          <a:xfrm>
+            <a:off x="5091951" y="4291759"/>
+            <a:ext cx="2037351" cy="1015663"/>
+          </a:xfrm>
+          <a:prstGeom prst="rect">
+            <a:avLst/>
+          </a:prstGeom>
+        </p:spPr>
+        <p:txBody>
+          <a:bodyPr wrap="square">
+            <a:spAutoFit/>
+          </a:bodyPr>
+          <a:lstStyle/>
+          <a:p>
+            <a:pPr marL="342900" indent="-342900">
+              <a:buFont typeface="Arial" panose="020B0604020202020204" pitchFamily="34" charset="0"/>
+              <a:buChar char="•"/>
+            </a:pPr>
+            <a:r>
+              <a:rPr lang="pt-BR" sz="1200" dirty="0" smtClean="0">
+                <a:latin typeface="Exo 2" panose="00000500000000000000" pitchFamily="50" charset="0"/>
+              </a:rPr>
+              <a:t>“Ai, quanta burocracia” </a:t>
+            </a:r>
+          </a:p>
+          <a:p>
+            <a:pPr marL="342900" indent="-342900">
+              <a:buFont typeface="Arial" panose="020B0604020202020204" pitchFamily="34" charset="0"/>
+              <a:buChar char="•"/>
+            </a:pPr>
+            <a:r>
+              <a:rPr lang="pt-BR" sz="1200" dirty="0" smtClean="0">
+                <a:latin typeface="Exo 2" panose="00000500000000000000" pitchFamily="50" charset="0"/>
+              </a:rPr>
+              <a:t>“Porque será que eles precisam do meu endereço”</a:t>
+            </a:r>
+            <a:endParaRPr lang="pt-BR" sz="1200" dirty="0">
+              <a:latin typeface="Exo 2" panose="00000500000000000000" pitchFamily="50" charset="0"/>
+            </a:endParaRPr>
+          </a:p>
+        </p:txBody>
+      </p:sp>
+      <p:sp>
+        <p:nvSpPr>
+          <p:cNvPr id="43" name="Retângulo 42">
+            <a:extLst>
+              <a:ext uri="{FF2B5EF4-FFF2-40B4-BE49-F238E27FC236}">
+                <a16:creationId xmlns:a16="http://schemas.microsoft.com/office/drawing/2014/main" xmlns="" id="{38E392A5-D5C4-4E93-81B3-2C2DDE0DF481}"/>
+              </a:ext>
+            </a:extLst>
+          </p:cNvPr>
+          <p:cNvSpPr/>
+          <p:nvPr/>
+        </p:nvSpPr>
+        <p:spPr>
+          <a:xfrm>
+            <a:off x="7326578" y="4267456"/>
+            <a:ext cx="2037351" cy="1015663"/>
+          </a:xfrm>
+          <a:prstGeom prst="rect">
+            <a:avLst/>
+          </a:prstGeom>
+        </p:spPr>
+        <p:txBody>
+          <a:bodyPr wrap="square">
+            <a:spAutoFit/>
+          </a:bodyPr>
+          <a:lstStyle/>
+          <a:p>
+            <a:pPr marL="342900" indent="-342900">
+              <a:buFont typeface="Arial" panose="020B0604020202020204" pitchFamily="34" charset="0"/>
+              <a:buChar char="•"/>
+            </a:pPr>
+            <a:r>
+              <a:rPr lang="pt-BR" sz="1200" dirty="0" smtClean="0">
+                <a:latin typeface="Exo 2" panose="00000500000000000000" pitchFamily="50" charset="0"/>
+              </a:rPr>
+              <a:t>“Finalmente conclui o cadastro” </a:t>
+            </a:r>
+          </a:p>
+          <a:p>
+            <a:pPr marL="342900" indent="-342900">
+              <a:buFont typeface="Arial" panose="020B0604020202020204" pitchFamily="34" charset="0"/>
+              <a:buChar char="•"/>
+            </a:pPr>
+            <a:r>
+              <a:rPr lang="pt-BR" sz="1200" dirty="0" smtClean="0">
+                <a:latin typeface="Exo 2" panose="00000500000000000000" pitchFamily="50" charset="0"/>
+              </a:rPr>
+              <a:t>“Agora é mais rápido”</a:t>
+            </a:r>
+            <a:endParaRPr lang="pt-BR" sz="1200" dirty="0">
+              <a:latin typeface="Exo 2" panose="00000500000000000000" pitchFamily="50" charset="0"/>
+            </a:endParaRPr>
+          </a:p>
+        </p:txBody>
+      </p:sp>
+      <p:sp>
+        <p:nvSpPr>
+          <p:cNvPr id="44" name="Retângulo 43">
+            <a:extLst>
+              <a:ext uri="{FF2B5EF4-FFF2-40B4-BE49-F238E27FC236}">
+                <a16:creationId xmlns:a16="http://schemas.microsoft.com/office/drawing/2014/main" xmlns="" id="{38E392A5-D5C4-4E93-81B3-2C2DDE0DF481}"/>
+              </a:ext>
+            </a:extLst>
+          </p:cNvPr>
+          <p:cNvSpPr/>
+          <p:nvPr/>
+        </p:nvSpPr>
+        <p:spPr>
+          <a:xfrm>
+            <a:off x="9343115" y="4384091"/>
+            <a:ext cx="2037351" cy="830997"/>
+          </a:xfrm>
+          <a:prstGeom prst="rect">
+            <a:avLst/>
+          </a:prstGeom>
+        </p:spPr>
+        <p:txBody>
+          <a:bodyPr wrap="square">
+            <a:spAutoFit/>
+          </a:bodyPr>
+          <a:lstStyle/>
+          <a:p>
+            <a:pPr marL="342900" indent="-342900">
+              <a:buFont typeface="Arial" panose="020B0604020202020204" pitchFamily="34" charset="0"/>
+              <a:buChar char="•"/>
+            </a:pPr>
+            <a:r>
+              <a:rPr lang="pt-BR" sz="1200" dirty="0" smtClean="0">
+                <a:latin typeface="Exo 2" panose="00000500000000000000" pitchFamily="50" charset="0"/>
+              </a:rPr>
+              <a:t>“Agora sim, tenho as informações que eu queria” </a:t>
+            </a:r>
+          </a:p>
+        </p:txBody>
+      </p:sp>
+      <p:sp>
+        <p:nvSpPr>
+          <p:cNvPr id="47" name="Retângulo 46">
+            <a:extLst>
+              <a:ext uri="{FF2B5EF4-FFF2-40B4-BE49-F238E27FC236}">
+                <a16:creationId xmlns:a16="http://schemas.microsoft.com/office/drawing/2014/main" xmlns="" id="{38E392A5-D5C4-4E93-81B3-2C2DDE0DF481}"/>
+              </a:ext>
+            </a:extLst>
+          </p:cNvPr>
+          <p:cNvSpPr/>
+          <p:nvPr/>
+        </p:nvSpPr>
+        <p:spPr>
+          <a:xfrm>
+            <a:off x="3059042" y="5985315"/>
+            <a:ext cx="2037351" cy="276999"/>
+          </a:xfrm>
+          <a:prstGeom prst="rect">
+            <a:avLst/>
+          </a:prstGeom>
+        </p:spPr>
+        <p:txBody>
+          <a:bodyPr wrap="square">
+            <a:spAutoFit/>
+          </a:bodyPr>
+          <a:lstStyle/>
+          <a:p>
+            <a:pPr marL="342900" indent="-342900">
+              <a:buFont typeface="Arial" panose="020B0604020202020204" pitchFamily="34" charset="0"/>
+              <a:buChar char="•"/>
+            </a:pPr>
+            <a:endParaRPr lang="pt-BR" sz="1200" dirty="0">
+              <a:latin typeface="Exo 2" panose="00000500000000000000" pitchFamily="50" charset="0"/>
+            </a:endParaRPr>
+          </a:p>
+        </p:txBody>
+      </p:sp>
+      <p:sp>
+        <p:nvSpPr>
+          <p:cNvPr id="48" name="Retângulo 47">
+            <a:extLst>
+              <a:ext uri="{FF2B5EF4-FFF2-40B4-BE49-F238E27FC236}">
+                <a16:creationId xmlns:a16="http://schemas.microsoft.com/office/drawing/2014/main" xmlns="" id="{38E392A5-D5C4-4E93-81B3-2C2DDE0DF481}"/>
+              </a:ext>
+            </a:extLst>
+          </p:cNvPr>
+          <p:cNvSpPr/>
+          <p:nvPr/>
+        </p:nvSpPr>
+        <p:spPr>
+          <a:xfrm>
+            <a:off x="5032224" y="5743091"/>
+            <a:ext cx="2037351" cy="830997"/>
+          </a:xfrm>
+          <a:prstGeom prst="rect">
+            <a:avLst/>
+          </a:prstGeom>
+        </p:spPr>
+        <p:txBody>
+          <a:bodyPr wrap="square">
+            <a:spAutoFit/>
+          </a:bodyPr>
+          <a:lstStyle/>
+          <a:p>
+            <a:pPr marL="342900" indent="-342900">
+              <a:buFont typeface="Arial" panose="020B0604020202020204" pitchFamily="34" charset="0"/>
+              <a:buChar char="•"/>
+            </a:pPr>
+            <a:r>
+              <a:rPr lang="pt-BR" sz="1200" dirty="0" smtClean="0">
+                <a:latin typeface="Exo 2" panose="00000500000000000000" pitchFamily="50" charset="0"/>
+              </a:rPr>
+              <a:t>Separar o cadastro em etapas para não parecer longo</a:t>
+            </a:r>
+            <a:endParaRPr lang="pt-BR" sz="1200" dirty="0">
+              <a:latin typeface="Exo 2" panose="00000500000000000000" pitchFamily="50" charset="0"/>
+            </a:endParaRPr>
+          </a:p>
+        </p:txBody>
+      </p:sp>
+      <p:sp>
+        <p:nvSpPr>
+          <p:cNvPr id="49" name="Retângulo 48">
+            <a:extLst>
+              <a:ext uri="{FF2B5EF4-FFF2-40B4-BE49-F238E27FC236}">
+                <a16:creationId xmlns:a16="http://schemas.microsoft.com/office/drawing/2014/main" xmlns="" id="{38E392A5-D5C4-4E93-81B3-2C2DDE0DF481}"/>
+              </a:ext>
+            </a:extLst>
+          </p:cNvPr>
+          <p:cNvSpPr/>
+          <p:nvPr/>
+        </p:nvSpPr>
+        <p:spPr>
+          <a:xfrm>
+            <a:off x="7247040" y="5591073"/>
+            <a:ext cx="2125583" cy="1200329"/>
+          </a:xfrm>
+          <a:prstGeom prst="rect">
+            <a:avLst/>
+          </a:prstGeom>
+        </p:spPr>
+        <p:txBody>
+          <a:bodyPr wrap="square">
+            <a:spAutoFit/>
+          </a:bodyPr>
+          <a:lstStyle/>
+          <a:p>
+            <a:pPr marL="342900" indent="-342900">
+              <a:buFont typeface="Arial" panose="020B0604020202020204" pitchFamily="34" charset="0"/>
+              <a:buChar char="•"/>
+            </a:pPr>
+            <a:r>
+              <a:rPr lang="pt-BR" sz="1200" dirty="0" smtClean="0">
+                <a:latin typeface="Exo 2" panose="00000500000000000000" pitchFamily="50" charset="0"/>
+              </a:rPr>
+              <a:t>Após o cadastro, fazer a realização do </a:t>
+            </a:r>
+            <a:r>
+              <a:rPr lang="pt-BR" sz="1200" dirty="0" err="1" smtClean="0">
+                <a:latin typeface="Exo 2" panose="00000500000000000000" pitchFamily="50" charset="0"/>
+              </a:rPr>
+              <a:t>login</a:t>
+            </a:r>
+            <a:r>
+              <a:rPr lang="pt-BR" sz="1200" dirty="0" smtClean="0">
+                <a:latin typeface="Exo 2" panose="00000500000000000000" pitchFamily="50" charset="0"/>
+              </a:rPr>
+              <a:t> automático, para minimizar o tempo</a:t>
+            </a:r>
+            <a:endParaRPr lang="pt-BR" sz="1200" dirty="0">
+              <a:latin typeface="Exo 2" panose="00000500000000000000" pitchFamily="50" charset="0"/>
+            </a:endParaRPr>
+          </a:p>
+        </p:txBody>
+      </p:sp>
+      <p:sp>
+        <p:nvSpPr>
+          <p:cNvPr id="50" name="Retângulo 49">
+            <a:extLst>
+              <a:ext uri="{FF2B5EF4-FFF2-40B4-BE49-F238E27FC236}">
+                <a16:creationId xmlns:a16="http://schemas.microsoft.com/office/drawing/2014/main" xmlns="" id="{38E392A5-D5C4-4E93-81B3-2C2DDE0DF481}"/>
+              </a:ext>
+            </a:extLst>
+          </p:cNvPr>
+          <p:cNvSpPr/>
+          <p:nvPr/>
+        </p:nvSpPr>
+        <p:spPr>
+          <a:xfrm>
+            <a:off x="9343114" y="5660007"/>
+            <a:ext cx="2037351" cy="1015663"/>
+          </a:xfrm>
+          <a:prstGeom prst="rect">
+            <a:avLst/>
+          </a:prstGeom>
+        </p:spPr>
+        <p:txBody>
+          <a:bodyPr wrap="square">
+            <a:spAutoFit/>
+          </a:bodyPr>
+          <a:lstStyle/>
+          <a:p>
+            <a:pPr marL="342900" indent="-342900">
+              <a:buFont typeface="Arial" panose="020B0604020202020204" pitchFamily="34" charset="0"/>
+              <a:buChar char="•"/>
+            </a:pPr>
+            <a:r>
+              <a:rPr lang="pt-BR" sz="1200" dirty="0" smtClean="0">
+                <a:latin typeface="Exo 2" panose="00000500000000000000" pitchFamily="50" charset="0"/>
+              </a:rPr>
+              <a:t>Deixar a </a:t>
+            </a:r>
+            <a:r>
+              <a:rPr lang="pt-BR" sz="1200" dirty="0" err="1" smtClean="0">
+                <a:latin typeface="Exo 2" panose="00000500000000000000" pitchFamily="50" charset="0"/>
+              </a:rPr>
+              <a:t>dashbord</a:t>
+            </a:r>
+            <a:r>
+              <a:rPr lang="pt-BR" sz="1200" dirty="0" smtClean="0">
+                <a:latin typeface="Exo 2" panose="00000500000000000000" pitchFamily="50" charset="0"/>
+              </a:rPr>
+              <a:t> bem intuitiva para não confundir o usuário</a:t>
+            </a:r>
+            <a:endParaRPr lang="pt-BR" sz="1200" dirty="0">
+              <a:latin typeface="Exo 2" panose="00000500000000000000" pitchFamily="50" charset="0"/>
+            </a:endParaRPr>
+          </a:p>
+        </p:txBody>
+      </p:sp>
+      <p:sp>
+        <p:nvSpPr>
+          <p:cNvPr id="51" name="Retângulo 50">
+            <a:extLst>
+              <a:ext uri="{FF2B5EF4-FFF2-40B4-BE49-F238E27FC236}">
+                <a16:creationId xmlns:a16="http://schemas.microsoft.com/office/drawing/2014/main" xmlns="" id="{38E392A5-D5C4-4E93-81B3-2C2DDE0DF481}"/>
+              </a:ext>
+            </a:extLst>
+          </p:cNvPr>
+          <p:cNvSpPr/>
+          <p:nvPr/>
+        </p:nvSpPr>
+        <p:spPr>
+          <a:xfrm>
+            <a:off x="2803586" y="5786748"/>
+            <a:ext cx="2037351" cy="646331"/>
+          </a:xfrm>
+          <a:prstGeom prst="rect">
+            <a:avLst/>
+          </a:prstGeom>
+        </p:spPr>
+        <p:txBody>
+          <a:bodyPr wrap="square">
+            <a:spAutoFit/>
+          </a:bodyPr>
+          <a:lstStyle/>
+          <a:p>
+            <a:pPr marL="342900" indent="-342900">
+              <a:buFont typeface="Arial" panose="020B0604020202020204" pitchFamily="34" charset="0"/>
+              <a:buChar char="•"/>
+            </a:pPr>
+            <a:r>
+              <a:rPr lang="pt-BR" sz="1200" dirty="0" smtClean="0">
+                <a:latin typeface="Exo 2" panose="00000500000000000000" pitchFamily="50" charset="0"/>
+              </a:rPr>
+              <a:t>Botões maiores para melhor sinalização </a:t>
+            </a:r>
+            <a:endParaRPr lang="pt-BR" sz="1200" dirty="0">
+              <a:latin typeface="Exo 2" panose="00000500000000000000" pitchFamily="50" charset="0"/>
+            </a:endParaRPr>
+          </a:p>
+        </p:txBody>
+      </p:sp>
     </p:spTree>
     <p:extLst>
       <p:ext uri="{BB962C8B-B14F-4D97-AF65-F5344CB8AC3E}">
@@ -7255,6 +7846,13 @@
   <p:clrMapOvr>
     <a:masterClrMapping/>
   </p:clrMapOvr>
+  <p:timing>
+    <p:tnLst>
+      <p:par>
+        <p:cTn id="1" dur="indefinite" restart="never" nodeType="tmRoot"/>
+      </p:par>
+    </p:tnLst>
+  </p:timing>
 </p:sld>
 </file>
 
@@ -8298,6 +8896,7 @@
 <file path=customXml/itemProps3.xml><?xml version="1.0" encoding="utf-8"?>
 <ds:datastoreItem xmlns:ds="http://schemas.openxmlformats.org/officeDocument/2006/customXml" ds:itemID="{620ED59B-F67D-4B99-A0A7-E5237FF58100}">
   <ds:schemaRefs>
+    <ds:schemaRef ds:uri="http://schemas.microsoft.com/office/2006/metadata/properties"/>
     <ds:schemaRef ds:uri="http://schemas.microsoft.com/office/2006/documentManagement/types"/>
     <ds:schemaRef ds:uri="http://purl.org/dc/terms/"/>
     <ds:schemaRef ds:uri="http://schemas.openxmlformats.org/package/2006/metadata/core-properties"/>
@@ -8305,7 +8904,6 @@
     <ds:schemaRef ds:uri="http://purl.org/dc/dcmitype/"/>
     <ds:schemaRef ds:uri="http://schemas.microsoft.com/office/infopath/2007/PartnerControls"/>
     <ds:schemaRef ds:uri="http://purl.org/dc/elements/1.1/"/>
-    <ds:schemaRef ds:uri="http://schemas.microsoft.com/office/2006/metadata/properties"/>
     <ds:schemaRef ds:uri="71af3243-3dd4-4a8d-8c0d-dd76da1f02a5"/>
     <ds:schemaRef ds:uri="http://www.w3.org/XML/1998/namespace"/>
   </ds:schemaRefs>

</xml_diff>